<commit_message>
fix bugs for gridsearch in fitting model with best parameters, adding Catboost and SVM to q2_fraud_detection models
</commit_message>
<xml_diff>
--- a/consolidated_answers.pptx
+++ b/consolidated_answers.pptx
@@ -6833,7 +6833,7 @@
           <a:p>
             <a:fld id="{5B59738F-BA60-493E-818C-8226DE26E785}" type="datetimeFigureOut">
               <a:rPr lang="en-MY" smtClean="0"/>
-              <a:t>24/8/2020</a:t>
+              <a:t>29/8/2020</a:t>
             </a:fld>
             <a:endParaRPr lang="en-MY"/>
           </a:p>
@@ -7033,7 +7033,7 @@
           <a:p>
             <a:fld id="{5B59738F-BA60-493E-818C-8226DE26E785}" type="datetimeFigureOut">
               <a:rPr lang="en-MY" smtClean="0"/>
-              <a:t>24/8/2020</a:t>
+              <a:t>29/8/2020</a:t>
             </a:fld>
             <a:endParaRPr lang="en-MY"/>
           </a:p>
@@ -7243,7 +7243,7 @@
           <a:p>
             <a:fld id="{5B59738F-BA60-493E-818C-8226DE26E785}" type="datetimeFigureOut">
               <a:rPr lang="en-MY" smtClean="0"/>
-              <a:t>24/8/2020</a:t>
+              <a:t>29/8/2020</a:t>
             </a:fld>
             <a:endParaRPr lang="en-MY"/>
           </a:p>
@@ -7443,7 +7443,7 @@
           <a:p>
             <a:fld id="{5B59738F-BA60-493E-818C-8226DE26E785}" type="datetimeFigureOut">
               <a:rPr lang="en-MY" smtClean="0"/>
-              <a:t>24/8/2020</a:t>
+              <a:t>29/8/2020</a:t>
             </a:fld>
             <a:endParaRPr lang="en-MY"/>
           </a:p>
@@ -7719,7 +7719,7 @@
           <a:p>
             <a:fld id="{5B59738F-BA60-493E-818C-8226DE26E785}" type="datetimeFigureOut">
               <a:rPr lang="en-MY" smtClean="0"/>
-              <a:t>24/8/2020</a:t>
+              <a:t>29/8/2020</a:t>
             </a:fld>
             <a:endParaRPr lang="en-MY"/>
           </a:p>
@@ -7987,7 +7987,7 @@
           <a:p>
             <a:fld id="{5B59738F-BA60-493E-818C-8226DE26E785}" type="datetimeFigureOut">
               <a:rPr lang="en-MY" smtClean="0"/>
-              <a:t>24/8/2020</a:t>
+              <a:t>29/8/2020</a:t>
             </a:fld>
             <a:endParaRPr lang="en-MY"/>
           </a:p>
@@ -8402,7 +8402,7 @@
           <a:p>
             <a:fld id="{5B59738F-BA60-493E-818C-8226DE26E785}" type="datetimeFigureOut">
               <a:rPr lang="en-MY" smtClean="0"/>
-              <a:t>24/8/2020</a:t>
+              <a:t>29/8/2020</a:t>
             </a:fld>
             <a:endParaRPr lang="en-MY"/>
           </a:p>
@@ -8544,7 +8544,7 @@
           <a:p>
             <a:fld id="{5B59738F-BA60-493E-818C-8226DE26E785}" type="datetimeFigureOut">
               <a:rPr lang="en-MY" smtClean="0"/>
-              <a:t>24/8/2020</a:t>
+              <a:t>29/8/2020</a:t>
             </a:fld>
             <a:endParaRPr lang="en-MY"/>
           </a:p>
@@ -8657,7 +8657,7 @@
           <a:p>
             <a:fld id="{5B59738F-BA60-493E-818C-8226DE26E785}" type="datetimeFigureOut">
               <a:rPr lang="en-MY" smtClean="0"/>
-              <a:t>24/8/2020</a:t>
+              <a:t>29/8/2020</a:t>
             </a:fld>
             <a:endParaRPr lang="en-MY"/>
           </a:p>
@@ -8970,7 +8970,7 @@
           <a:p>
             <a:fld id="{5B59738F-BA60-493E-818C-8226DE26E785}" type="datetimeFigureOut">
               <a:rPr lang="en-MY" smtClean="0"/>
-              <a:t>24/8/2020</a:t>
+              <a:t>29/8/2020</a:t>
             </a:fld>
             <a:endParaRPr lang="en-MY"/>
           </a:p>
@@ -9259,7 +9259,7 @@
           <a:p>
             <a:fld id="{5B59738F-BA60-493E-818C-8226DE26E785}" type="datetimeFigureOut">
               <a:rPr lang="en-MY" smtClean="0"/>
-              <a:t>24/8/2020</a:t>
+              <a:t>29/8/2020</a:t>
             </a:fld>
             <a:endParaRPr lang="en-MY"/>
           </a:p>
@@ -9502,7 +9502,7 @@
           <a:p>
             <a:fld id="{5B59738F-BA60-493E-818C-8226DE26E785}" type="datetimeFigureOut">
               <a:rPr lang="en-MY" smtClean="0"/>
-              <a:t>24/8/2020</a:t>
+              <a:t>29/8/2020</a:t>
             </a:fld>
             <a:endParaRPr lang="en-MY"/>
           </a:p>
@@ -11753,14 +11753,14 @@
           <p:nvPr>
             <p:extLst>
               <p:ext uri="{D42A27DB-BD31-4B8C-83A1-F6EECF244321}">
-                <p14:modId xmlns:p14="http://schemas.microsoft.com/office/powerpoint/2010/main" val="3074673616"/>
+                <p14:modId xmlns:p14="http://schemas.microsoft.com/office/powerpoint/2010/main" val="3111433550"/>
               </p:ext>
             </p:extLst>
           </p:nvPr>
         </p:nvGraphicFramePr>
         <p:xfrm>
-          <a:off x="4297133" y="509560"/>
-          <a:ext cx="7764375" cy="2675969"/>
+          <a:off x="4297133" y="423986"/>
+          <a:ext cx="7764375" cy="3099047"/>
         </p:xfrm>
         <a:graphic>
           <a:graphicData uri="http://schemas.openxmlformats.org/drawingml/2006/table">
@@ -12763,7 +12763,7 @@
                     <a:p>
                       <a:pPr algn="l" fontAlgn="b"/>
                       <a:r>
-                        <a:rPr lang="en-MY" sz="900" b="1" i="0" u="none" strike="noStrike">
+                        <a:rPr lang="en-MY" sz="900" b="1" i="0" u="none" strike="noStrike" dirty="0" err="1">
                           <a:solidFill>
                             <a:srgbClr val="000000"/>
                           </a:solidFill>
@@ -12772,6 +12772,13 @@
                         </a:rPr>
                         <a:t>RandomForest</a:t>
                       </a:r>
+                      <a:endParaRPr lang="en-MY" sz="900" b="1" i="0" u="none" strike="noStrike" dirty="0">
+                        <a:solidFill>
+                          <a:srgbClr val="000000"/>
+                        </a:solidFill>
+                        <a:effectLst/>
+                        <a:latin typeface="Calibri" panose="020F0502020204030204" pitchFamily="34" charset="0"/>
+                      </a:endParaRPr>
                     </a:p>
                   </a:txBody>
                   <a:tcPr marL="9525" marR="9525" marT="9525" marB="0" anchor="b">
@@ -13507,7 +13514,7 @@
                     <a:p>
                       <a:pPr algn="r" fontAlgn="b"/>
                       <a:r>
-                        <a:rPr lang="en-MY" sz="900" b="0" i="0" u="none" strike="noStrike" dirty="0">
+                        <a:rPr lang="en-MY" sz="900" b="0" i="0" u="none" strike="noStrike">
                           <a:solidFill>
                             <a:srgbClr val="000000"/>
                           </a:solidFill>
@@ -13571,7 +13578,7 @@
                     <a:p>
                       <a:pPr algn="l" fontAlgn="b"/>
                       <a:r>
-                        <a:rPr lang="en-MY" sz="900" b="1" i="0" u="none" strike="noStrike">
+                        <a:rPr lang="en-MY" sz="900" b="1" i="0" u="none" strike="noStrike" dirty="0" err="1">
                           <a:solidFill>
                             <a:srgbClr val="000000"/>
                           </a:solidFill>
@@ -13580,6 +13587,13 @@
                         </a:rPr>
                         <a:t>XGBoost</a:t>
                       </a:r>
+                      <a:endParaRPr lang="en-MY" sz="900" b="1" i="0" u="none" strike="noStrike" dirty="0">
+                        <a:solidFill>
+                          <a:srgbClr val="000000"/>
+                        </a:solidFill>
+                        <a:effectLst/>
+                        <a:latin typeface="Calibri" panose="020F0502020204030204" pitchFamily="34" charset="0"/>
+                      </a:endParaRPr>
                     </a:p>
                   </a:txBody>
                   <a:tcPr marL="9525" marR="9525" marT="9525" marB="0" anchor="b">
@@ -14379,7 +14393,822 @@
                     <a:p>
                       <a:pPr algn="l" fontAlgn="b"/>
                       <a:r>
-                        <a:rPr lang="en-MY" sz="900" b="1" i="0" u="none" strike="noStrike">
+                        <a:rPr lang="en-MY" sz="900" b="1" i="0" u="none" strike="noStrike" dirty="0" err="1">
+                          <a:solidFill>
+                            <a:srgbClr val="000000"/>
+                          </a:solidFill>
+                          <a:effectLst/>
+                          <a:latin typeface="Calibri" panose="020F0502020204030204" pitchFamily="34" charset="0"/>
+                        </a:rPr>
+                        <a:t>CatBoost</a:t>
+                      </a:r>
+                      <a:endParaRPr lang="en-MY" sz="900" b="1" i="0" u="none" strike="noStrike" dirty="0">
+                        <a:solidFill>
+                          <a:srgbClr val="000000"/>
+                        </a:solidFill>
+                        <a:effectLst/>
+                        <a:latin typeface="Calibri" panose="020F0502020204030204" pitchFamily="34" charset="0"/>
+                      </a:endParaRPr>
+                    </a:p>
+                  </a:txBody>
+                  <a:tcPr marL="9525" marR="9525" marT="9525" marB="0" anchor="b">
+                    <a:lnL w="12700" cap="flat" cmpd="sng" algn="ctr">
+                      <a:solidFill>
+                        <a:schemeClr val="tx1"/>
+                      </a:solidFill>
+                      <a:prstDash val="solid"/>
+                      <a:round/>
+                      <a:headEnd type="none" w="med" len="med"/>
+                      <a:tailEnd type="none" w="med" len="med"/>
+                    </a:lnL>
+                    <a:lnR w="12700" cap="flat" cmpd="sng" algn="ctr">
+                      <a:solidFill>
+                        <a:schemeClr val="tx1"/>
+                      </a:solidFill>
+                      <a:prstDash val="solid"/>
+                      <a:round/>
+                      <a:headEnd type="none" w="med" len="med"/>
+                      <a:tailEnd type="none" w="med" len="med"/>
+                    </a:lnR>
+                    <a:lnT w="12700" cap="flat" cmpd="sng" algn="ctr">
+                      <a:solidFill>
+                        <a:schemeClr val="tx1"/>
+                      </a:solidFill>
+                      <a:prstDash val="solid"/>
+                      <a:round/>
+                      <a:headEnd type="none" w="med" len="med"/>
+                      <a:tailEnd type="none" w="med" len="med"/>
+                    </a:lnT>
+                    <a:lnB w="12700" cap="flat" cmpd="sng" algn="ctr">
+                      <a:solidFill>
+                        <a:schemeClr val="tx1"/>
+                      </a:solidFill>
+                      <a:prstDash val="solid"/>
+                      <a:round/>
+                      <a:headEnd type="none" w="med" len="med"/>
+                      <a:tailEnd type="none" w="med" len="med"/>
+                    </a:lnB>
+                    <a:solidFill>
+                      <a:schemeClr val="accent4"/>
+                    </a:solidFill>
+                  </a:tcPr>
+                </a:tc>
+                <a:tc>
+                  <a:txBody>
+                    <a:bodyPr/>
+                    <a:lstStyle/>
+                    <a:p>
+                      <a:pPr algn="r" fontAlgn="b"/>
+                      <a:r>
+                        <a:rPr lang="en-MY" sz="900" b="0" i="0" u="none" strike="noStrike" dirty="0">
+                          <a:solidFill>
+                            <a:srgbClr val="000000"/>
+                          </a:solidFill>
+                          <a:effectLst/>
+                          <a:latin typeface="Calibri" panose="020F0502020204030204" pitchFamily="34" charset="0"/>
+                        </a:rPr>
+                        <a:t>0.972973</a:t>
+                      </a:r>
+                    </a:p>
+                  </a:txBody>
+                  <a:tcPr marL="9525" marR="9525" marT="9525" marB="0" anchor="b">
+                    <a:lnL w="12700" cap="flat" cmpd="sng" algn="ctr">
+                      <a:solidFill>
+                        <a:schemeClr val="tx1"/>
+                      </a:solidFill>
+                      <a:prstDash val="solid"/>
+                      <a:round/>
+                      <a:headEnd type="none" w="med" len="med"/>
+                      <a:tailEnd type="none" w="med" len="med"/>
+                    </a:lnL>
+                    <a:lnR w="12700" cap="flat" cmpd="sng" algn="ctr">
+                      <a:solidFill>
+                        <a:schemeClr val="tx1"/>
+                      </a:solidFill>
+                      <a:prstDash val="solid"/>
+                      <a:round/>
+                      <a:headEnd type="none" w="med" len="med"/>
+                      <a:tailEnd type="none" w="med" len="med"/>
+                    </a:lnR>
+                    <a:lnT w="12700" cap="flat" cmpd="sng" algn="ctr">
+                      <a:solidFill>
+                        <a:schemeClr val="tx1"/>
+                      </a:solidFill>
+                      <a:prstDash val="solid"/>
+                      <a:round/>
+                      <a:headEnd type="none" w="med" len="med"/>
+                      <a:tailEnd type="none" w="med" len="med"/>
+                    </a:lnT>
+                    <a:lnB w="12700" cap="flat" cmpd="sng" algn="ctr">
+                      <a:solidFill>
+                        <a:schemeClr val="tx1"/>
+                      </a:solidFill>
+                      <a:prstDash val="solid"/>
+                      <a:round/>
+                      <a:headEnd type="none" w="med" len="med"/>
+                      <a:tailEnd type="none" w="med" len="med"/>
+                    </a:lnB>
+                  </a:tcPr>
+                </a:tc>
+                <a:tc>
+                  <a:txBody>
+                    <a:bodyPr/>
+                    <a:lstStyle/>
+                    <a:p>
+                      <a:pPr algn="r" fontAlgn="b"/>
+                      <a:r>
+                        <a:rPr lang="en-MY" sz="900" b="0" i="0" u="none" strike="noStrike" dirty="0">
+                          <a:solidFill>
+                            <a:srgbClr val="000000"/>
+                          </a:solidFill>
+                          <a:effectLst/>
+                          <a:latin typeface="Calibri" panose="020F0502020204030204" pitchFamily="34" charset="0"/>
+                        </a:rPr>
+                        <a:t>0.893808</a:t>
+                      </a:r>
+                    </a:p>
+                  </a:txBody>
+                  <a:tcPr marL="9525" marR="9525" marT="9525" marB="0" anchor="b">
+                    <a:lnL w="12700" cap="flat" cmpd="sng" algn="ctr">
+                      <a:solidFill>
+                        <a:schemeClr val="tx1"/>
+                      </a:solidFill>
+                      <a:prstDash val="solid"/>
+                      <a:round/>
+                      <a:headEnd type="none" w="med" len="med"/>
+                      <a:tailEnd type="none" w="med" len="med"/>
+                    </a:lnL>
+                    <a:lnR w="12700" cap="flat" cmpd="sng" algn="ctr">
+                      <a:solidFill>
+                        <a:schemeClr val="tx1"/>
+                      </a:solidFill>
+                      <a:prstDash val="solid"/>
+                      <a:round/>
+                      <a:headEnd type="none" w="med" len="med"/>
+                      <a:tailEnd type="none" w="med" len="med"/>
+                    </a:lnR>
+                    <a:lnT w="12700" cap="flat" cmpd="sng" algn="ctr">
+                      <a:solidFill>
+                        <a:schemeClr val="tx1"/>
+                      </a:solidFill>
+                      <a:prstDash val="solid"/>
+                      <a:round/>
+                      <a:headEnd type="none" w="med" len="med"/>
+                      <a:tailEnd type="none" w="med" len="med"/>
+                    </a:lnT>
+                    <a:lnB w="12700" cap="flat" cmpd="sng" algn="ctr">
+                      <a:solidFill>
+                        <a:schemeClr val="tx1"/>
+                      </a:solidFill>
+                      <a:prstDash val="solid"/>
+                      <a:round/>
+                      <a:headEnd type="none" w="med" len="med"/>
+                      <a:tailEnd type="none" w="med" len="med"/>
+                    </a:lnB>
+                  </a:tcPr>
+                </a:tc>
+                <a:tc>
+                  <a:txBody>
+                    <a:bodyPr/>
+                    <a:lstStyle/>
+                    <a:p>
+                      <a:pPr algn="r" fontAlgn="b"/>
+                      <a:r>
+                        <a:rPr lang="en-MY" sz="900" b="0" i="0" u="none" strike="noStrike">
+                          <a:solidFill>
+                            <a:srgbClr val="000000"/>
+                          </a:solidFill>
+                          <a:effectLst/>
+                          <a:latin typeface="Calibri" panose="020F0502020204030204" pitchFamily="34" charset="0"/>
+                        </a:rPr>
+                        <a:t>0.972973</a:t>
+                      </a:r>
+                    </a:p>
+                  </a:txBody>
+                  <a:tcPr marL="9525" marR="9525" marT="9525" marB="0" anchor="b">
+                    <a:lnL w="12700" cap="flat" cmpd="sng" algn="ctr">
+                      <a:solidFill>
+                        <a:schemeClr val="tx1"/>
+                      </a:solidFill>
+                      <a:prstDash val="solid"/>
+                      <a:round/>
+                      <a:headEnd type="none" w="med" len="med"/>
+                      <a:tailEnd type="none" w="med" len="med"/>
+                    </a:lnL>
+                    <a:lnR w="12700" cap="flat" cmpd="sng" algn="ctr">
+                      <a:solidFill>
+                        <a:schemeClr val="tx1"/>
+                      </a:solidFill>
+                      <a:prstDash val="solid"/>
+                      <a:round/>
+                      <a:headEnd type="none" w="med" len="med"/>
+                      <a:tailEnd type="none" w="med" len="med"/>
+                    </a:lnR>
+                    <a:lnT w="12700" cap="flat" cmpd="sng" algn="ctr">
+                      <a:solidFill>
+                        <a:schemeClr val="tx1"/>
+                      </a:solidFill>
+                      <a:prstDash val="solid"/>
+                      <a:round/>
+                      <a:headEnd type="none" w="med" len="med"/>
+                      <a:tailEnd type="none" w="med" len="med"/>
+                    </a:lnT>
+                    <a:lnB w="12700" cap="flat" cmpd="sng" algn="ctr">
+                      <a:solidFill>
+                        <a:schemeClr val="tx1"/>
+                      </a:solidFill>
+                      <a:prstDash val="solid"/>
+                      <a:round/>
+                      <a:headEnd type="none" w="med" len="med"/>
+                      <a:tailEnd type="none" w="med" len="med"/>
+                    </a:lnB>
+                  </a:tcPr>
+                </a:tc>
+                <a:tc>
+                  <a:txBody>
+                    <a:bodyPr/>
+                    <a:lstStyle/>
+                    <a:p>
+                      <a:pPr algn="r" fontAlgn="b"/>
+                      <a:r>
+                        <a:rPr lang="en-MY" sz="900" b="0" i="0" u="none" strike="noStrike">
+                          <a:solidFill>
+                            <a:srgbClr val="000000"/>
+                          </a:solidFill>
+                          <a:effectLst/>
+                          <a:latin typeface="Calibri" panose="020F0502020204030204" pitchFamily="34" charset="0"/>
+                        </a:rPr>
+                        <a:t>0.955513</a:t>
+                      </a:r>
+                    </a:p>
+                  </a:txBody>
+                  <a:tcPr marL="9525" marR="9525" marT="9525" marB="0" anchor="b">
+                    <a:lnL w="12700" cap="flat" cmpd="sng" algn="ctr">
+                      <a:solidFill>
+                        <a:schemeClr val="tx1"/>
+                      </a:solidFill>
+                      <a:prstDash val="solid"/>
+                      <a:round/>
+                      <a:headEnd type="none" w="med" len="med"/>
+                      <a:tailEnd type="none" w="med" len="med"/>
+                    </a:lnL>
+                    <a:lnR w="12700" cap="flat" cmpd="sng" algn="ctr">
+                      <a:solidFill>
+                        <a:schemeClr val="tx1"/>
+                      </a:solidFill>
+                      <a:prstDash val="solid"/>
+                      <a:round/>
+                      <a:headEnd type="none" w="med" len="med"/>
+                      <a:tailEnd type="none" w="med" len="med"/>
+                    </a:lnR>
+                    <a:lnT w="12700" cap="flat" cmpd="sng" algn="ctr">
+                      <a:solidFill>
+                        <a:schemeClr val="tx1"/>
+                      </a:solidFill>
+                      <a:prstDash val="solid"/>
+                      <a:round/>
+                      <a:headEnd type="none" w="med" len="med"/>
+                      <a:tailEnd type="none" w="med" len="med"/>
+                    </a:lnT>
+                    <a:lnB w="12700" cap="flat" cmpd="sng" algn="ctr">
+                      <a:solidFill>
+                        <a:schemeClr val="tx1"/>
+                      </a:solidFill>
+                      <a:prstDash val="solid"/>
+                      <a:round/>
+                      <a:headEnd type="none" w="med" len="med"/>
+                      <a:tailEnd type="none" w="med" len="med"/>
+                    </a:lnB>
+                  </a:tcPr>
+                </a:tc>
+                <a:tc>
+                  <a:txBody>
+                    <a:bodyPr/>
+                    <a:lstStyle/>
+                    <a:p>
+                      <a:pPr algn="r" fontAlgn="b"/>
+                      <a:r>
+                        <a:rPr lang="en-MY" sz="900" b="0" i="0" u="none" strike="noStrike">
+                          <a:solidFill>
+                            <a:srgbClr val="000000"/>
+                          </a:solidFill>
+                          <a:effectLst/>
+                          <a:latin typeface="Calibri" panose="020F0502020204030204" pitchFamily="34" charset="0"/>
+                        </a:rPr>
+                        <a:t>0.946006</a:t>
+                      </a:r>
+                    </a:p>
+                  </a:txBody>
+                  <a:tcPr marL="9525" marR="9525" marT="9525" marB="0" anchor="b">
+                    <a:lnL w="12700" cap="flat" cmpd="sng" algn="ctr">
+                      <a:solidFill>
+                        <a:schemeClr val="tx1"/>
+                      </a:solidFill>
+                      <a:prstDash val="solid"/>
+                      <a:round/>
+                      <a:headEnd type="none" w="med" len="med"/>
+                      <a:tailEnd type="none" w="med" len="med"/>
+                    </a:lnL>
+                    <a:lnR w="12700" cap="flat" cmpd="sng" algn="ctr">
+                      <a:solidFill>
+                        <a:schemeClr val="tx1"/>
+                      </a:solidFill>
+                      <a:prstDash val="solid"/>
+                      <a:round/>
+                      <a:headEnd type="none" w="med" len="med"/>
+                      <a:tailEnd type="none" w="med" len="med"/>
+                    </a:lnR>
+                    <a:lnT w="12700" cap="flat" cmpd="sng" algn="ctr">
+                      <a:solidFill>
+                        <a:schemeClr val="tx1"/>
+                      </a:solidFill>
+                      <a:prstDash val="solid"/>
+                      <a:round/>
+                      <a:headEnd type="none" w="med" len="med"/>
+                      <a:tailEnd type="none" w="med" len="med"/>
+                    </a:lnT>
+                    <a:lnB w="12700" cap="flat" cmpd="sng" algn="ctr">
+                      <a:solidFill>
+                        <a:schemeClr val="tx1"/>
+                      </a:solidFill>
+                      <a:prstDash val="solid"/>
+                      <a:round/>
+                      <a:headEnd type="none" w="med" len="med"/>
+                      <a:tailEnd type="none" w="med" len="med"/>
+                    </a:lnB>
+                  </a:tcPr>
+                </a:tc>
+                <a:tc>
+                  <a:txBody>
+                    <a:bodyPr/>
+                    <a:lstStyle/>
+                    <a:p>
+                      <a:pPr algn="r" fontAlgn="b"/>
+                      <a:r>
+                        <a:rPr lang="en-MY" sz="900" b="0" i="0" u="none" strike="noStrike">
+                          <a:solidFill>
+                            <a:srgbClr val="000000"/>
+                          </a:solidFill>
+                          <a:effectLst/>
+                          <a:latin typeface="Calibri" panose="020F0502020204030204" pitchFamily="34" charset="0"/>
+                        </a:rPr>
+                        <a:t>0.735218</a:t>
+                      </a:r>
+                    </a:p>
+                  </a:txBody>
+                  <a:tcPr marL="9525" marR="9525" marT="9525" marB="0" anchor="b">
+                    <a:lnL w="12700" cap="flat" cmpd="sng" algn="ctr">
+                      <a:solidFill>
+                        <a:schemeClr val="tx1"/>
+                      </a:solidFill>
+                      <a:prstDash val="solid"/>
+                      <a:round/>
+                      <a:headEnd type="none" w="med" len="med"/>
+                      <a:tailEnd type="none" w="med" len="med"/>
+                    </a:lnL>
+                    <a:lnR w="12700" cap="flat" cmpd="sng" algn="ctr">
+                      <a:solidFill>
+                        <a:schemeClr val="tx1"/>
+                      </a:solidFill>
+                      <a:prstDash val="solid"/>
+                      <a:round/>
+                      <a:headEnd type="none" w="med" len="med"/>
+                      <a:tailEnd type="none" w="med" len="med"/>
+                    </a:lnR>
+                    <a:lnT w="12700" cap="flat" cmpd="sng" algn="ctr">
+                      <a:solidFill>
+                        <a:schemeClr val="tx1"/>
+                      </a:solidFill>
+                      <a:prstDash val="solid"/>
+                      <a:round/>
+                      <a:headEnd type="none" w="med" len="med"/>
+                      <a:tailEnd type="none" w="med" len="med"/>
+                    </a:lnT>
+                    <a:lnB w="12700" cap="flat" cmpd="sng" algn="ctr">
+                      <a:solidFill>
+                        <a:schemeClr val="tx1"/>
+                      </a:solidFill>
+                      <a:prstDash val="solid"/>
+                      <a:round/>
+                      <a:headEnd type="none" w="med" len="med"/>
+                      <a:tailEnd type="none" w="med" len="med"/>
+                    </a:lnB>
+                  </a:tcPr>
+                </a:tc>
+                <a:tc>
+                  <a:txBody>
+                    <a:bodyPr/>
+                    <a:lstStyle/>
+                    <a:p>
+                      <a:pPr algn="r" fontAlgn="b"/>
+                      <a:r>
+                        <a:rPr lang="en-MY" sz="900" b="0" i="0" u="none" strike="noStrike">
+                          <a:solidFill>
+                            <a:srgbClr val="000000"/>
+                          </a:solidFill>
+                          <a:effectLst/>
+                          <a:latin typeface="Calibri" panose="020F0502020204030204" pitchFamily="34" charset="0"/>
+                        </a:rPr>
+                        <a:t>0.97282</a:t>
+                      </a:r>
+                    </a:p>
+                  </a:txBody>
+                  <a:tcPr marL="9525" marR="9525" marT="9525" marB="0" anchor="b">
+                    <a:lnL w="12700" cap="flat" cmpd="sng" algn="ctr">
+                      <a:solidFill>
+                        <a:schemeClr val="tx1"/>
+                      </a:solidFill>
+                      <a:prstDash val="solid"/>
+                      <a:round/>
+                      <a:headEnd type="none" w="med" len="med"/>
+                      <a:tailEnd type="none" w="med" len="med"/>
+                    </a:lnL>
+                    <a:lnR w="12700" cap="flat" cmpd="sng" algn="ctr">
+                      <a:solidFill>
+                        <a:schemeClr val="tx1"/>
+                      </a:solidFill>
+                      <a:prstDash val="solid"/>
+                      <a:round/>
+                      <a:headEnd type="none" w="med" len="med"/>
+                      <a:tailEnd type="none" w="med" len="med"/>
+                    </a:lnR>
+                    <a:lnT w="12700" cap="flat" cmpd="sng" algn="ctr">
+                      <a:solidFill>
+                        <a:schemeClr val="tx1"/>
+                      </a:solidFill>
+                      <a:prstDash val="solid"/>
+                      <a:round/>
+                      <a:headEnd type="none" w="med" len="med"/>
+                      <a:tailEnd type="none" w="med" len="med"/>
+                    </a:lnT>
+                    <a:lnB w="12700" cap="flat" cmpd="sng" algn="ctr">
+                      <a:solidFill>
+                        <a:schemeClr val="tx1"/>
+                      </a:solidFill>
+                      <a:prstDash val="solid"/>
+                      <a:round/>
+                      <a:headEnd type="none" w="med" len="med"/>
+                      <a:tailEnd type="none" w="med" len="med"/>
+                    </a:lnB>
+                  </a:tcPr>
+                </a:tc>
+                <a:tc>
+                  <a:txBody>
+                    <a:bodyPr/>
+                    <a:lstStyle/>
+                    <a:p>
+                      <a:pPr algn="r" fontAlgn="b"/>
+                      <a:r>
+                        <a:rPr lang="en-MY" sz="900" b="0" i="0" u="none" strike="noStrike">
+                          <a:solidFill>
+                            <a:srgbClr val="000000"/>
+                          </a:solidFill>
+                          <a:effectLst/>
+                          <a:latin typeface="Calibri" panose="020F0502020204030204" pitchFamily="34" charset="0"/>
+                        </a:rPr>
+                        <a:t>0.756944</a:t>
+                      </a:r>
+                    </a:p>
+                  </a:txBody>
+                  <a:tcPr marL="9525" marR="9525" marT="9525" marB="0" anchor="b">
+                    <a:lnL w="12700" cap="flat" cmpd="sng" algn="ctr">
+                      <a:solidFill>
+                        <a:schemeClr val="tx1"/>
+                      </a:solidFill>
+                      <a:prstDash val="solid"/>
+                      <a:round/>
+                      <a:headEnd type="none" w="med" len="med"/>
+                      <a:tailEnd type="none" w="med" len="med"/>
+                    </a:lnL>
+                    <a:lnR w="12700" cap="flat" cmpd="sng" algn="ctr">
+                      <a:solidFill>
+                        <a:schemeClr val="tx1"/>
+                      </a:solidFill>
+                      <a:prstDash val="solid"/>
+                      <a:round/>
+                      <a:headEnd type="none" w="med" len="med"/>
+                      <a:tailEnd type="none" w="med" len="med"/>
+                    </a:lnR>
+                    <a:lnT w="12700" cap="flat" cmpd="sng" algn="ctr">
+                      <a:solidFill>
+                        <a:schemeClr val="tx1"/>
+                      </a:solidFill>
+                      <a:prstDash val="solid"/>
+                      <a:round/>
+                      <a:headEnd type="none" w="med" len="med"/>
+                      <a:tailEnd type="none" w="med" len="med"/>
+                    </a:lnT>
+                    <a:lnB w="12700" cap="flat" cmpd="sng" algn="ctr">
+                      <a:solidFill>
+                        <a:schemeClr val="tx1"/>
+                      </a:solidFill>
+                      <a:prstDash val="solid"/>
+                      <a:round/>
+                      <a:headEnd type="none" w="med" len="med"/>
+                      <a:tailEnd type="none" w="med" len="med"/>
+                    </a:lnB>
+                  </a:tcPr>
+                </a:tc>
+                <a:tc>
+                  <a:txBody>
+                    <a:bodyPr/>
+                    <a:lstStyle/>
+                    <a:p>
+                      <a:pPr algn="r" fontAlgn="b"/>
+                      <a:r>
+                        <a:rPr lang="en-MY" sz="900" b="0" i="0" u="none" strike="noStrike">
+                          <a:solidFill>
+                            <a:srgbClr val="000000"/>
+                          </a:solidFill>
+                          <a:effectLst/>
+                          <a:latin typeface="Calibri" panose="020F0502020204030204" pitchFamily="34" charset="0"/>
+                        </a:rPr>
+                        <a:t>92</a:t>
+                      </a:r>
+                    </a:p>
+                  </a:txBody>
+                  <a:tcPr marL="9525" marR="9525" marT="9525" marB="0" anchor="b">
+                    <a:lnL w="12700" cap="flat" cmpd="sng" algn="ctr">
+                      <a:solidFill>
+                        <a:schemeClr val="tx1"/>
+                      </a:solidFill>
+                      <a:prstDash val="solid"/>
+                      <a:round/>
+                      <a:headEnd type="none" w="med" len="med"/>
+                      <a:tailEnd type="none" w="med" len="med"/>
+                    </a:lnL>
+                    <a:lnR w="12700" cap="flat" cmpd="sng" algn="ctr">
+                      <a:solidFill>
+                        <a:schemeClr val="tx1"/>
+                      </a:solidFill>
+                      <a:prstDash val="solid"/>
+                      <a:round/>
+                      <a:headEnd type="none" w="med" len="med"/>
+                      <a:tailEnd type="none" w="med" len="med"/>
+                    </a:lnR>
+                    <a:lnT w="12700" cap="flat" cmpd="sng" algn="ctr">
+                      <a:solidFill>
+                        <a:schemeClr val="tx1"/>
+                      </a:solidFill>
+                      <a:prstDash val="solid"/>
+                      <a:round/>
+                      <a:headEnd type="none" w="med" len="med"/>
+                      <a:tailEnd type="none" w="med" len="med"/>
+                    </a:lnT>
+                    <a:lnB w="12700" cap="flat" cmpd="sng" algn="ctr">
+                      <a:solidFill>
+                        <a:schemeClr val="tx1"/>
+                      </a:solidFill>
+                      <a:prstDash val="solid"/>
+                      <a:round/>
+                      <a:headEnd type="none" w="med" len="med"/>
+                      <a:tailEnd type="none" w="med" len="med"/>
+                    </a:lnB>
+                  </a:tcPr>
+                </a:tc>
+                <a:tc>
+                  <a:txBody>
+                    <a:bodyPr/>
+                    <a:lstStyle/>
+                    <a:p>
+                      <a:pPr algn="r" fontAlgn="b"/>
+                      <a:r>
+                        <a:rPr lang="en-MY" sz="900" b="0" i="0" u="none" strike="noStrike">
+                          <a:solidFill>
+                            <a:srgbClr val="000000"/>
+                          </a:solidFill>
+                          <a:effectLst/>
+                          <a:latin typeface="Calibri" panose="020F0502020204030204" pitchFamily="34" charset="0"/>
+                        </a:rPr>
+                        <a:t>48</a:t>
+                      </a:r>
+                    </a:p>
+                  </a:txBody>
+                  <a:tcPr marL="9525" marR="9525" marT="9525" marB="0" anchor="b">
+                    <a:lnL w="12700" cap="flat" cmpd="sng" algn="ctr">
+                      <a:solidFill>
+                        <a:schemeClr val="tx1"/>
+                      </a:solidFill>
+                      <a:prstDash val="solid"/>
+                      <a:round/>
+                      <a:headEnd type="none" w="med" len="med"/>
+                      <a:tailEnd type="none" w="med" len="med"/>
+                    </a:lnL>
+                    <a:lnR w="12700" cap="flat" cmpd="sng" algn="ctr">
+                      <a:solidFill>
+                        <a:schemeClr val="tx1"/>
+                      </a:solidFill>
+                      <a:prstDash val="solid"/>
+                      <a:round/>
+                      <a:headEnd type="none" w="med" len="med"/>
+                      <a:tailEnd type="none" w="med" len="med"/>
+                    </a:lnR>
+                    <a:lnT w="12700" cap="flat" cmpd="sng" algn="ctr">
+                      <a:solidFill>
+                        <a:schemeClr val="tx1"/>
+                      </a:solidFill>
+                      <a:prstDash val="solid"/>
+                      <a:round/>
+                      <a:headEnd type="none" w="med" len="med"/>
+                      <a:tailEnd type="none" w="med" len="med"/>
+                    </a:lnT>
+                    <a:lnB w="12700" cap="flat" cmpd="sng" algn="ctr">
+                      <a:solidFill>
+                        <a:schemeClr val="tx1"/>
+                      </a:solidFill>
+                      <a:prstDash val="solid"/>
+                      <a:round/>
+                      <a:headEnd type="none" w="med" len="med"/>
+                      <a:tailEnd type="none" w="med" len="med"/>
+                    </a:lnB>
+                  </a:tcPr>
+                </a:tc>
+                <a:tc>
+                  <a:txBody>
+                    <a:bodyPr/>
+                    <a:lstStyle/>
+                    <a:p>
+                      <a:pPr algn="r" fontAlgn="b"/>
+                      <a:r>
+                        <a:rPr lang="en-MY" sz="900" b="0" i="0" u="none" strike="noStrike">
+                          <a:solidFill>
+                            <a:srgbClr val="000000"/>
+                          </a:solidFill>
+                          <a:effectLst/>
+                          <a:latin typeface="Calibri" panose="020F0502020204030204" pitchFamily="34" charset="0"/>
+                        </a:rPr>
+                        <a:t>218</a:t>
+                      </a:r>
+                    </a:p>
+                  </a:txBody>
+                  <a:tcPr marL="9525" marR="9525" marT="9525" marB="0" anchor="b">
+                    <a:lnL w="12700" cap="flat" cmpd="sng" algn="ctr">
+                      <a:solidFill>
+                        <a:schemeClr val="tx1"/>
+                      </a:solidFill>
+                      <a:prstDash val="solid"/>
+                      <a:round/>
+                      <a:headEnd type="none" w="med" len="med"/>
+                      <a:tailEnd type="none" w="med" len="med"/>
+                    </a:lnL>
+                    <a:lnR w="12700" cap="flat" cmpd="sng" algn="ctr">
+                      <a:solidFill>
+                        <a:schemeClr val="tx1"/>
+                      </a:solidFill>
+                      <a:prstDash val="solid"/>
+                      <a:round/>
+                      <a:headEnd type="none" w="med" len="med"/>
+                      <a:tailEnd type="none" w="med" len="med"/>
+                    </a:lnR>
+                    <a:lnT w="12700" cap="flat" cmpd="sng" algn="ctr">
+                      <a:solidFill>
+                        <a:schemeClr val="tx1"/>
+                      </a:solidFill>
+                      <a:prstDash val="solid"/>
+                      <a:round/>
+                      <a:headEnd type="none" w="med" len="med"/>
+                      <a:tailEnd type="none" w="med" len="med"/>
+                    </a:lnT>
+                    <a:lnB w="12700" cap="flat" cmpd="sng" algn="ctr">
+                      <a:solidFill>
+                        <a:schemeClr val="tx1"/>
+                      </a:solidFill>
+                      <a:prstDash val="solid"/>
+                      <a:round/>
+                      <a:headEnd type="none" w="med" len="med"/>
+                      <a:tailEnd type="none" w="med" len="med"/>
+                    </a:lnB>
+                  </a:tcPr>
+                </a:tc>
+                <a:tc>
+                  <a:txBody>
+                    <a:bodyPr/>
+                    <a:lstStyle/>
+                    <a:p>
+                      <a:pPr algn="r" fontAlgn="b"/>
+                      <a:r>
+                        <a:rPr lang="en-MY" sz="900" b="0" i="0" u="none" strike="noStrike">
+                          <a:solidFill>
+                            <a:srgbClr val="000000"/>
+                          </a:solidFill>
+                          <a:effectLst/>
+                          <a:latin typeface="Calibri" panose="020F0502020204030204" pitchFamily="34" charset="0"/>
+                        </a:rPr>
+                        <a:t>-1270000</a:t>
+                      </a:r>
+                    </a:p>
+                  </a:txBody>
+                  <a:tcPr marL="9525" marR="9525" marT="9525" marB="0" anchor="b">
+                    <a:lnL w="12700" cap="flat" cmpd="sng" algn="ctr">
+                      <a:solidFill>
+                        <a:schemeClr val="tx1"/>
+                      </a:solidFill>
+                      <a:prstDash val="solid"/>
+                      <a:round/>
+                      <a:headEnd type="none" w="med" len="med"/>
+                      <a:tailEnd type="none" w="med" len="med"/>
+                    </a:lnL>
+                    <a:lnR w="12700" cap="flat" cmpd="sng" algn="ctr">
+                      <a:solidFill>
+                        <a:schemeClr val="tx1"/>
+                      </a:solidFill>
+                      <a:prstDash val="solid"/>
+                      <a:round/>
+                      <a:headEnd type="none" w="med" len="med"/>
+                      <a:tailEnd type="none" w="med" len="med"/>
+                    </a:lnR>
+                    <a:lnT w="12700" cap="flat" cmpd="sng" algn="ctr">
+                      <a:solidFill>
+                        <a:schemeClr val="tx1"/>
+                      </a:solidFill>
+                      <a:prstDash val="solid"/>
+                      <a:round/>
+                      <a:headEnd type="none" w="med" len="med"/>
+                      <a:tailEnd type="none" w="med" len="med"/>
+                    </a:lnT>
+                    <a:lnB w="12700" cap="flat" cmpd="sng" algn="ctr">
+                      <a:solidFill>
+                        <a:schemeClr val="tx1"/>
+                      </a:solidFill>
+                      <a:prstDash val="solid"/>
+                      <a:round/>
+                      <a:headEnd type="none" w="med" len="med"/>
+                      <a:tailEnd type="none" w="med" len="med"/>
+                    </a:lnB>
+                  </a:tcPr>
+                </a:tc>
+                <a:tc>
+                  <a:txBody>
+                    <a:bodyPr/>
+                    <a:lstStyle/>
+                    <a:p>
+                      <a:pPr algn="r" fontAlgn="b"/>
+                      <a:r>
+                        <a:rPr lang="en-MY" sz="900" b="0" i="0" u="none" strike="noStrike">
+                          <a:solidFill>
+                            <a:srgbClr val="000000"/>
+                          </a:solidFill>
+                          <a:effectLst/>
+                          <a:latin typeface="Calibri" panose="020F0502020204030204" pitchFamily="34" charset="0"/>
+                        </a:rPr>
+                        <a:t>3</a:t>
+                      </a:r>
+                    </a:p>
+                  </a:txBody>
+                  <a:tcPr marL="9525" marR="9525" marT="9525" marB="0" anchor="b">
+                    <a:lnL w="12700" cap="flat" cmpd="sng" algn="ctr">
+                      <a:solidFill>
+                        <a:schemeClr val="tx1"/>
+                      </a:solidFill>
+                      <a:prstDash val="solid"/>
+                      <a:round/>
+                      <a:headEnd type="none" w="med" len="med"/>
+                      <a:tailEnd type="none" w="med" len="med"/>
+                    </a:lnL>
+                    <a:lnR w="12700" cap="flat" cmpd="sng" algn="ctr">
+                      <a:solidFill>
+                        <a:schemeClr val="tx1"/>
+                      </a:solidFill>
+                      <a:prstDash val="solid"/>
+                      <a:round/>
+                      <a:headEnd type="none" w="med" len="med"/>
+                      <a:tailEnd type="none" w="med" len="med"/>
+                    </a:lnR>
+                    <a:lnT w="12700" cap="flat" cmpd="sng" algn="ctr">
+                      <a:solidFill>
+                        <a:schemeClr val="tx1"/>
+                      </a:solidFill>
+                      <a:prstDash val="solid"/>
+                      <a:round/>
+                      <a:headEnd type="none" w="med" len="med"/>
+                      <a:tailEnd type="none" w="med" len="med"/>
+                    </a:lnT>
+                    <a:lnB w="12700" cap="flat" cmpd="sng" algn="ctr">
+                      <a:solidFill>
+                        <a:schemeClr val="tx1"/>
+                      </a:solidFill>
+                      <a:prstDash val="solid"/>
+                      <a:round/>
+                      <a:headEnd type="none" w="med" len="med"/>
+                      <a:tailEnd type="none" w="med" len="med"/>
+                    </a:lnB>
+                  </a:tcPr>
+                </a:tc>
+                <a:extLst>
+                  <a:ext uri="{0D108BD9-81ED-4DB2-BD59-A6C34878D82A}">
+                    <a16:rowId xmlns:a16="http://schemas.microsoft.com/office/drawing/2014/main" val="3382022166"/>
+                  </a:ext>
+                </a:extLst>
+              </a:tr>
+              <a:tr h="211539">
+                <a:tc>
+                  <a:txBody>
+                    <a:bodyPr/>
+                    <a:lstStyle/>
+                    <a:p>
+                      <a:pPr algn="l" fontAlgn="b"/>
+                      <a:r>
+                        <a:rPr lang="en-MY" sz="900" b="1" i="0" u="none" strike="noStrike" dirty="0" err="1">
                           <a:solidFill>
                             <a:srgbClr val="000000"/>
                           </a:solidFill>
@@ -14388,6 +15217,13 @@
                         </a:rPr>
                         <a:t>LightGBM</a:t>
                       </a:r>
+                      <a:endParaRPr lang="en-MY" sz="900" b="1" i="0" u="none" strike="noStrike" dirty="0">
+                        <a:solidFill>
+                          <a:srgbClr val="000000"/>
+                        </a:solidFill>
+                        <a:effectLst/>
+                        <a:latin typeface="Calibri" panose="020F0502020204030204" pitchFamily="34" charset="0"/>
+                      </a:endParaRPr>
                     </a:p>
                   </a:txBody>
                   <a:tcPr marL="9525" marR="9525" marT="9525" marB="0" anchor="b">
@@ -14610,7 +15446,7 @@
                     <a:p>
                       <a:pPr algn="r" fontAlgn="b"/>
                       <a:r>
-                        <a:rPr lang="en-MY" sz="900" b="0" i="0" u="none" strike="noStrike">
+                        <a:rPr lang="en-MY" sz="900" b="0" i="0" u="none" strike="noStrike" dirty="0">
                           <a:solidFill>
                             <a:srgbClr val="000000"/>
                           </a:solidFill>
@@ -14667,7 +15503,7 @@
                     <a:p>
                       <a:pPr algn="r" fontAlgn="b"/>
                       <a:r>
-                        <a:rPr lang="en-MY" sz="900" b="0" i="0" u="none" strike="noStrike">
+                        <a:rPr lang="en-MY" sz="900" b="0" i="0" u="none" strike="noStrike" dirty="0">
                           <a:solidFill>
                             <a:srgbClr val="000000"/>
                           </a:solidFill>
@@ -15074,814 +15910,6 @@
                           <a:latin typeface="Calibri" panose="020F0502020204030204" pitchFamily="34" charset="0"/>
                         </a:rPr>
                         <a:t>-1278000</a:t>
-                      </a:r>
-                    </a:p>
-                  </a:txBody>
-                  <a:tcPr marL="9525" marR="9525" marT="9525" marB="0" anchor="b">
-                    <a:lnL w="12700" cap="flat" cmpd="sng" algn="ctr">
-                      <a:solidFill>
-                        <a:schemeClr val="tx1"/>
-                      </a:solidFill>
-                      <a:prstDash val="solid"/>
-                      <a:round/>
-                      <a:headEnd type="none" w="med" len="med"/>
-                      <a:tailEnd type="none" w="med" len="med"/>
-                    </a:lnL>
-                    <a:lnR w="12700" cap="flat" cmpd="sng" algn="ctr">
-                      <a:solidFill>
-                        <a:schemeClr val="tx1"/>
-                      </a:solidFill>
-                      <a:prstDash val="solid"/>
-                      <a:round/>
-                      <a:headEnd type="none" w="med" len="med"/>
-                      <a:tailEnd type="none" w="med" len="med"/>
-                    </a:lnR>
-                    <a:lnT w="12700" cap="flat" cmpd="sng" algn="ctr">
-                      <a:solidFill>
-                        <a:schemeClr val="tx1"/>
-                      </a:solidFill>
-                      <a:prstDash val="solid"/>
-                      <a:round/>
-                      <a:headEnd type="none" w="med" len="med"/>
-                      <a:tailEnd type="none" w="med" len="med"/>
-                    </a:lnT>
-                    <a:lnB w="12700" cap="flat" cmpd="sng" algn="ctr">
-                      <a:solidFill>
-                        <a:schemeClr val="tx1"/>
-                      </a:solidFill>
-                      <a:prstDash val="solid"/>
-                      <a:round/>
-                      <a:headEnd type="none" w="med" len="med"/>
-                      <a:tailEnd type="none" w="med" len="med"/>
-                    </a:lnB>
-                  </a:tcPr>
-                </a:tc>
-                <a:tc>
-                  <a:txBody>
-                    <a:bodyPr/>
-                    <a:lstStyle/>
-                    <a:p>
-                      <a:pPr algn="r" fontAlgn="b"/>
-                      <a:r>
-                        <a:rPr lang="en-MY" sz="900" b="0" i="0" u="none" strike="noStrike">
-                          <a:solidFill>
-                            <a:srgbClr val="000000"/>
-                          </a:solidFill>
-                          <a:effectLst/>
-                          <a:latin typeface="Calibri" panose="020F0502020204030204" pitchFamily="34" charset="0"/>
-                        </a:rPr>
-                        <a:t>3</a:t>
-                      </a:r>
-                    </a:p>
-                  </a:txBody>
-                  <a:tcPr marL="9525" marR="9525" marT="9525" marB="0" anchor="b">
-                    <a:lnL w="12700" cap="flat" cmpd="sng" algn="ctr">
-                      <a:solidFill>
-                        <a:schemeClr val="tx1"/>
-                      </a:solidFill>
-                      <a:prstDash val="solid"/>
-                      <a:round/>
-                      <a:headEnd type="none" w="med" len="med"/>
-                      <a:tailEnd type="none" w="med" len="med"/>
-                    </a:lnL>
-                    <a:lnR w="12700" cap="flat" cmpd="sng" algn="ctr">
-                      <a:solidFill>
-                        <a:schemeClr val="tx1"/>
-                      </a:solidFill>
-                      <a:prstDash val="solid"/>
-                      <a:round/>
-                      <a:headEnd type="none" w="med" len="med"/>
-                      <a:tailEnd type="none" w="med" len="med"/>
-                    </a:lnR>
-                    <a:lnT w="12700" cap="flat" cmpd="sng" algn="ctr">
-                      <a:solidFill>
-                        <a:schemeClr val="tx1"/>
-                      </a:solidFill>
-                      <a:prstDash val="solid"/>
-                      <a:round/>
-                      <a:headEnd type="none" w="med" len="med"/>
-                      <a:tailEnd type="none" w="med" len="med"/>
-                    </a:lnT>
-                    <a:lnB w="12700" cap="flat" cmpd="sng" algn="ctr">
-                      <a:solidFill>
-                        <a:schemeClr val="tx1"/>
-                      </a:solidFill>
-                      <a:prstDash val="solid"/>
-                      <a:round/>
-                      <a:headEnd type="none" w="med" len="med"/>
-                      <a:tailEnd type="none" w="med" len="med"/>
-                    </a:lnB>
-                  </a:tcPr>
-                </a:tc>
-                <a:extLst>
-                  <a:ext uri="{0D108BD9-81ED-4DB2-BD59-A6C34878D82A}">
-                    <a16:rowId xmlns:a16="http://schemas.microsoft.com/office/drawing/2014/main" val="3382022166"/>
-                  </a:ext>
-                </a:extLst>
-              </a:tr>
-              <a:tr h="211539">
-                <a:tc>
-                  <a:txBody>
-                    <a:bodyPr/>
-                    <a:lstStyle/>
-                    <a:p>
-                      <a:pPr algn="l" fontAlgn="b"/>
-                      <a:r>
-                        <a:rPr lang="en-MY" sz="900" b="1" i="0" u="none" strike="noStrike">
-                          <a:solidFill>
-                            <a:srgbClr val="000000"/>
-                          </a:solidFill>
-                          <a:effectLst/>
-                          <a:latin typeface="Calibri" panose="020F0502020204030204" pitchFamily="34" charset="0"/>
-                        </a:rPr>
-                        <a:t>LightGBMGridSearch</a:t>
-                      </a:r>
-                    </a:p>
-                  </a:txBody>
-                  <a:tcPr marL="9525" marR="9525" marT="9525" marB="0" anchor="b">
-                    <a:lnL w="12700" cap="flat" cmpd="sng" algn="ctr">
-                      <a:solidFill>
-                        <a:schemeClr val="tx1"/>
-                      </a:solidFill>
-                      <a:prstDash val="solid"/>
-                      <a:round/>
-                      <a:headEnd type="none" w="med" len="med"/>
-                      <a:tailEnd type="none" w="med" len="med"/>
-                    </a:lnL>
-                    <a:lnR w="12700" cap="flat" cmpd="sng" algn="ctr">
-                      <a:solidFill>
-                        <a:schemeClr val="tx1"/>
-                      </a:solidFill>
-                      <a:prstDash val="solid"/>
-                      <a:round/>
-                      <a:headEnd type="none" w="med" len="med"/>
-                      <a:tailEnd type="none" w="med" len="med"/>
-                    </a:lnR>
-                    <a:lnT w="12700" cap="flat" cmpd="sng" algn="ctr">
-                      <a:solidFill>
-                        <a:schemeClr val="tx1"/>
-                      </a:solidFill>
-                      <a:prstDash val="solid"/>
-                      <a:round/>
-                      <a:headEnd type="none" w="med" len="med"/>
-                      <a:tailEnd type="none" w="med" len="med"/>
-                    </a:lnT>
-                    <a:lnB w="12700" cap="flat" cmpd="sng" algn="ctr">
-                      <a:solidFill>
-                        <a:schemeClr val="tx1"/>
-                      </a:solidFill>
-                      <a:prstDash val="solid"/>
-                      <a:round/>
-                      <a:headEnd type="none" w="med" len="med"/>
-                      <a:tailEnd type="none" w="med" len="med"/>
-                    </a:lnB>
-                    <a:solidFill>
-                      <a:schemeClr val="accent4"/>
-                    </a:solidFill>
-                  </a:tcPr>
-                </a:tc>
-                <a:tc>
-                  <a:txBody>
-                    <a:bodyPr/>
-                    <a:lstStyle/>
-                    <a:p>
-                      <a:pPr algn="r" fontAlgn="b"/>
-                      <a:r>
-                        <a:rPr lang="en-MY" sz="900" b="0" i="0" u="none" strike="noStrike">
-                          <a:solidFill>
-                            <a:srgbClr val="000000"/>
-                          </a:solidFill>
-                          <a:effectLst/>
-                          <a:latin typeface="Calibri" panose="020F0502020204030204" pitchFamily="34" charset="0"/>
-                        </a:rPr>
-                        <a:t>0.999914</a:t>
-                      </a:r>
-                    </a:p>
-                  </a:txBody>
-                  <a:tcPr marL="9525" marR="9525" marT="9525" marB="0" anchor="b">
-                    <a:lnL w="12700" cap="flat" cmpd="sng" algn="ctr">
-                      <a:solidFill>
-                        <a:schemeClr val="tx1"/>
-                      </a:solidFill>
-                      <a:prstDash val="solid"/>
-                      <a:round/>
-                      <a:headEnd type="none" w="med" len="med"/>
-                      <a:tailEnd type="none" w="med" len="med"/>
-                    </a:lnL>
-                    <a:lnR w="12700" cap="flat" cmpd="sng" algn="ctr">
-                      <a:solidFill>
-                        <a:schemeClr val="tx1"/>
-                      </a:solidFill>
-                      <a:prstDash val="solid"/>
-                      <a:round/>
-                      <a:headEnd type="none" w="med" len="med"/>
-                      <a:tailEnd type="none" w="med" len="med"/>
-                    </a:lnR>
-                    <a:lnT w="12700" cap="flat" cmpd="sng" algn="ctr">
-                      <a:solidFill>
-                        <a:schemeClr val="tx1"/>
-                      </a:solidFill>
-                      <a:prstDash val="solid"/>
-                      <a:round/>
-                      <a:headEnd type="none" w="med" len="med"/>
-                      <a:tailEnd type="none" w="med" len="med"/>
-                    </a:lnT>
-                    <a:lnB w="12700" cap="flat" cmpd="sng" algn="ctr">
-                      <a:solidFill>
-                        <a:schemeClr val="tx1"/>
-                      </a:solidFill>
-                      <a:prstDash val="solid"/>
-                      <a:round/>
-                      <a:headEnd type="none" w="med" len="med"/>
-                      <a:tailEnd type="none" w="med" len="med"/>
-                    </a:lnB>
-                  </a:tcPr>
-                </a:tc>
-                <a:tc>
-                  <a:txBody>
-                    <a:bodyPr/>
-                    <a:lstStyle/>
-                    <a:p>
-                      <a:pPr algn="r" fontAlgn="b"/>
-                      <a:r>
-                        <a:rPr lang="en-MY" sz="900" b="0" i="0" u="none" strike="noStrike">
-                          <a:solidFill>
-                            <a:srgbClr val="000000"/>
-                          </a:solidFill>
-                          <a:effectLst/>
-                          <a:latin typeface="Calibri" panose="020F0502020204030204" pitchFamily="34" charset="0"/>
-                        </a:rPr>
-                        <a:t>0.892537</a:t>
-                      </a:r>
-                    </a:p>
-                  </a:txBody>
-                  <a:tcPr marL="9525" marR="9525" marT="9525" marB="0" anchor="b">
-                    <a:lnL w="12700" cap="flat" cmpd="sng" algn="ctr">
-                      <a:solidFill>
-                        <a:schemeClr val="tx1"/>
-                      </a:solidFill>
-                      <a:prstDash val="solid"/>
-                      <a:round/>
-                      <a:headEnd type="none" w="med" len="med"/>
-                      <a:tailEnd type="none" w="med" len="med"/>
-                    </a:lnL>
-                    <a:lnR w="12700" cap="flat" cmpd="sng" algn="ctr">
-                      <a:solidFill>
-                        <a:schemeClr val="tx1"/>
-                      </a:solidFill>
-                      <a:prstDash val="solid"/>
-                      <a:round/>
-                      <a:headEnd type="none" w="med" len="med"/>
-                      <a:tailEnd type="none" w="med" len="med"/>
-                    </a:lnR>
-                    <a:lnT w="12700" cap="flat" cmpd="sng" algn="ctr">
-                      <a:solidFill>
-                        <a:schemeClr val="tx1"/>
-                      </a:solidFill>
-                      <a:prstDash val="solid"/>
-                      <a:round/>
-                      <a:headEnd type="none" w="med" len="med"/>
-                      <a:tailEnd type="none" w="med" len="med"/>
-                    </a:lnT>
-                    <a:lnB w="12700" cap="flat" cmpd="sng" algn="ctr">
-                      <a:solidFill>
-                        <a:schemeClr val="tx1"/>
-                      </a:solidFill>
-                      <a:prstDash val="solid"/>
-                      <a:round/>
-                      <a:headEnd type="none" w="med" len="med"/>
-                      <a:tailEnd type="none" w="med" len="med"/>
-                    </a:lnB>
-                  </a:tcPr>
-                </a:tc>
-                <a:tc>
-                  <a:txBody>
-                    <a:bodyPr/>
-                    <a:lstStyle/>
-                    <a:p>
-                      <a:pPr algn="r" fontAlgn="b"/>
-                      <a:r>
-                        <a:rPr lang="en-MY" sz="900" b="0" i="0" u="none" strike="noStrike">
-                          <a:solidFill>
-                            <a:srgbClr val="000000"/>
-                          </a:solidFill>
-                          <a:effectLst/>
-                          <a:latin typeface="Calibri" panose="020F0502020204030204" pitchFamily="34" charset="0"/>
-                        </a:rPr>
-                        <a:t>0.999914</a:t>
-                      </a:r>
-                    </a:p>
-                  </a:txBody>
-                  <a:tcPr marL="9525" marR="9525" marT="9525" marB="0" anchor="b">
-                    <a:lnL w="12700" cap="flat" cmpd="sng" algn="ctr">
-                      <a:solidFill>
-                        <a:schemeClr val="tx1"/>
-                      </a:solidFill>
-                      <a:prstDash val="solid"/>
-                      <a:round/>
-                      <a:headEnd type="none" w="med" len="med"/>
-                      <a:tailEnd type="none" w="med" len="med"/>
-                    </a:lnL>
-                    <a:lnR w="12700" cap="flat" cmpd="sng" algn="ctr">
-                      <a:solidFill>
-                        <a:schemeClr val="tx1"/>
-                      </a:solidFill>
-                      <a:prstDash val="solid"/>
-                      <a:round/>
-                      <a:headEnd type="none" w="med" len="med"/>
-                      <a:tailEnd type="none" w="med" len="med"/>
-                    </a:lnR>
-                    <a:lnT w="12700" cap="flat" cmpd="sng" algn="ctr">
-                      <a:solidFill>
-                        <a:schemeClr val="tx1"/>
-                      </a:solidFill>
-                      <a:prstDash val="solid"/>
-                      <a:round/>
-                      <a:headEnd type="none" w="med" len="med"/>
-                      <a:tailEnd type="none" w="med" len="med"/>
-                    </a:lnT>
-                    <a:lnB w="12700" cap="flat" cmpd="sng" algn="ctr">
-                      <a:solidFill>
-                        <a:schemeClr val="tx1"/>
-                      </a:solidFill>
-                      <a:prstDash val="solid"/>
-                      <a:round/>
-                      <a:headEnd type="none" w="med" len="med"/>
-                      <a:tailEnd type="none" w="med" len="med"/>
-                    </a:lnB>
-                  </a:tcPr>
-                </a:tc>
-                <a:tc>
-                  <a:txBody>
-                    <a:bodyPr/>
-                    <a:lstStyle/>
-                    <a:p>
-                      <a:pPr algn="r" fontAlgn="b"/>
-                      <a:r>
-                        <a:rPr lang="en-MY" sz="900" b="0" i="0" u="none" strike="noStrike">
-                          <a:solidFill>
-                            <a:srgbClr val="000000"/>
-                          </a:solidFill>
-                          <a:effectLst/>
-                          <a:latin typeface="Calibri" panose="020F0502020204030204" pitchFamily="34" charset="0"/>
-                        </a:rPr>
-                        <a:t>0.965682</a:t>
-                      </a:r>
-                    </a:p>
-                  </a:txBody>
-                  <a:tcPr marL="9525" marR="9525" marT="9525" marB="0" anchor="b">
-                    <a:lnL w="12700" cap="flat" cmpd="sng" algn="ctr">
-                      <a:solidFill>
-                        <a:schemeClr val="tx1"/>
-                      </a:solidFill>
-                      <a:prstDash val="solid"/>
-                      <a:round/>
-                      <a:headEnd type="none" w="med" len="med"/>
-                      <a:tailEnd type="none" w="med" len="med"/>
-                    </a:lnL>
-                    <a:lnR w="12700" cap="flat" cmpd="sng" algn="ctr">
-                      <a:solidFill>
-                        <a:schemeClr val="tx1"/>
-                      </a:solidFill>
-                      <a:prstDash val="solid"/>
-                      <a:round/>
-                      <a:headEnd type="none" w="med" len="med"/>
-                      <a:tailEnd type="none" w="med" len="med"/>
-                    </a:lnR>
-                    <a:lnT w="12700" cap="flat" cmpd="sng" algn="ctr">
-                      <a:solidFill>
-                        <a:schemeClr val="tx1"/>
-                      </a:solidFill>
-                      <a:prstDash val="solid"/>
-                      <a:round/>
-                      <a:headEnd type="none" w="med" len="med"/>
-                      <a:tailEnd type="none" w="med" len="med"/>
-                    </a:lnT>
-                    <a:lnB w="12700" cap="flat" cmpd="sng" algn="ctr">
-                      <a:solidFill>
-                        <a:schemeClr val="tx1"/>
-                      </a:solidFill>
-                      <a:prstDash val="solid"/>
-                      <a:round/>
-                      <a:headEnd type="none" w="med" len="med"/>
-                      <a:tailEnd type="none" w="med" len="med"/>
-                    </a:lnB>
-                  </a:tcPr>
-                </a:tc>
-                <a:tc>
-                  <a:txBody>
-                    <a:bodyPr/>
-                    <a:lstStyle/>
-                    <a:p>
-                      <a:pPr algn="r" fontAlgn="b"/>
-                      <a:r>
-                        <a:rPr lang="en-MY" sz="900" b="0" i="0" u="none" strike="noStrike">
-                          <a:solidFill>
-                            <a:srgbClr val="000000"/>
-                          </a:solidFill>
-                          <a:effectLst/>
-                          <a:latin typeface="Calibri" panose="020F0502020204030204" pitchFamily="34" charset="0"/>
-                        </a:rPr>
-                        <a:t>0.999827</a:t>
-                      </a:r>
-                    </a:p>
-                  </a:txBody>
-                  <a:tcPr marL="9525" marR="9525" marT="9525" marB="0" anchor="b">
-                    <a:lnL w="12700" cap="flat" cmpd="sng" algn="ctr">
-                      <a:solidFill>
-                        <a:schemeClr val="tx1"/>
-                      </a:solidFill>
-                      <a:prstDash val="solid"/>
-                      <a:round/>
-                      <a:headEnd type="none" w="med" len="med"/>
-                      <a:tailEnd type="none" w="med" len="med"/>
-                    </a:lnL>
-                    <a:lnR w="12700" cap="flat" cmpd="sng" algn="ctr">
-                      <a:solidFill>
-                        <a:schemeClr val="tx1"/>
-                      </a:solidFill>
-                      <a:prstDash val="solid"/>
-                      <a:round/>
-                      <a:headEnd type="none" w="med" len="med"/>
-                      <a:tailEnd type="none" w="med" len="med"/>
-                    </a:lnR>
-                    <a:lnT w="12700" cap="flat" cmpd="sng" algn="ctr">
-                      <a:solidFill>
-                        <a:schemeClr val="tx1"/>
-                      </a:solidFill>
-                      <a:prstDash val="solid"/>
-                      <a:round/>
-                      <a:headEnd type="none" w="med" len="med"/>
-                      <a:tailEnd type="none" w="med" len="med"/>
-                    </a:lnT>
-                    <a:lnB w="12700" cap="flat" cmpd="sng" algn="ctr">
-                      <a:solidFill>
-                        <a:schemeClr val="tx1"/>
-                      </a:solidFill>
-                      <a:prstDash val="solid"/>
-                      <a:round/>
-                      <a:headEnd type="none" w="med" len="med"/>
-                      <a:tailEnd type="none" w="med" len="med"/>
-                    </a:lnB>
-                  </a:tcPr>
-                </a:tc>
-                <a:tc>
-                  <a:txBody>
-                    <a:bodyPr/>
-                    <a:lstStyle/>
-                    <a:p>
-                      <a:pPr algn="r" fontAlgn="b"/>
-                      <a:r>
-                        <a:rPr lang="en-MY" sz="900" b="0" i="0" u="none" strike="noStrike">
-                          <a:solidFill>
-                            <a:srgbClr val="000000"/>
-                          </a:solidFill>
-                          <a:effectLst/>
-                          <a:latin typeface="Calibri" panose="020F0502020204030204" pitchFamily="34" charset="0"/>
-                        </a:rPr>
-                        <a:t>0.779778</a:t>
-                      </a:r>
-                    </a:p>
-                  </a:txBody>
-                  <a:tcPr marL="9525" marR="9525" marT="9525" marB="0" anchor="b">
-                    <a:lnL w="12700" cap="flat" cmpd="sng" algn="ctr">
-                      <a:solidFill>
-                        <a:schemeClr val="tx1"/>
-                      </a:solidFill>
-                      <a:prstDash val="solid"/>
-                      <a:round/>
-                      <a:headEnd type="none" w="med" len="med"/>
-                      <a:tailEnd type="none" w="med" len="med"/>
-                    </a:lnL>
-                    <a:lnR w="12700" cap="flat" cmpd="sng" algn="ctr">
-                      <a:solidFill>
-                        <a:schemeClr val="tx1"/>
-                      </a:solidFill>
-                      <a:prstDash val="solid"/>
-                      <a:round/>
-                      <a:headEnd type="none" w="med" len="med"/>
-                      <a:tailEnd type="none" w="med" len="med"/>
-                    </a:lnR>
-                    <a:lnT w="12700" cap="flat" cmpd="sng" algn="ctr">
-                      <a:solidFill>
-                        <a:schemeClr val="tx1"/>
-                      </a:solidFill>
-                      <a:prstDash val="solid"/>
-                      <a:round/>
-                      <a:headEnd type="none" w="med" len="med"/>
-                      <a:tailEnd type="none" w="med" len="med"/>
-                    </a:lnT>
-                    <a:lnB w="12700" cap="flat" cmpd="sng" algn="ctr">
-                      <a:solidFill>
-                        <a:schemeClr val="tx1"/>
-                      </a:solidFill>
-                      <a:prstDash val="solid"/>
-                      <a:round/>
-                      <a:headEnd type="none" w="med" len="med"/>
-                      <a:tailEnd type="none" w="med" len="med"/>
-                    </a:lnB>
-                  </a:tcPr>
-                </a:tc>
-                <a:tc>
-                  <a:txBody>
-                    <a:bodyPr/>
-                    <a:lstStyle/>
-                    <a:p>
-                      <a:pPr algn="r" fontAlgn="b"/>
-                      <a:r>
-                        <a:rPr lang="en-MY" sz="900" b="0" i="0" u="none" strike="noStrike">
-                          <a:solidFill>
-                            <a:srgbClr val="000000"/>
-                          </a:solidFill>
-                          <a:effectLst/>
-                          <a:latin typeface="Calibri" panose="020F0502020204030204" pitchFamily="34" charset="0"/>
-                        </a:rPr>
-                        <a:t>0.999914</a:t>
-                      </a:r>
-                    </a:p>
-                  </a:txBody>
-                  <a:tcPr marL="9525" marR="9525" marT="9525" marB="0" anchor="b">
-                    <a:lnL w="12700" cap="flat" cmpd="sng" algn="ctr">
-                      <a:solidFill>
-                        <a:schemeClr val="tx1"/>
-                      </a:solidFill>
-                      <a:prstDash val="solid"/>
-                      <a:round/>
-                      <a:headEnd type="none" w="med" len="med"/>
-                      <a:tailEnd type="none" w="med" len="med"/>
-                    </a:lnL>
-                    <a:lnR w="12700" cap="flat" cmpd="sng" algn="ctr">
-                      <a:solidFill>
-                        <a:schemeClr val="tx1"/>
-                      </a:solidFill>
-                      <a:prstDash val="solid"/>
-                      <a:round/>
-                      <a:headEnd type="none" w="med" len="med"/>
-                      <a:tailEnd type="none" w="med" len="med"/>
-                    </a:lnR>
-                    <a:lnT w="12700" cap="flat" cmpd="sng" algn="ctr">
-                      <a:solidFill>
-                        <a:schemeClr val="tx1"/>
-                      </a:solidFill>
-                      <a:prstDash val="solid"/>
-                      <a:round/>
-                      <a:headEnd type="none" w="med" len="med"/>
-                      <a:tailEnd type="none" w="med" len="med"/>
-                    </a:lnT>
-                    <a:lnB w="12700" cap="flat" cmpd="sng" algn="ctr">
-                      <a:solidFill>
-                        <a:schemeClr val="tx1"/>
-                      </a:solidFill>
-                      <a:prstDash val="solid"/>
-                      <a:round/>
-                      <a:headEnd type="none" w="med" len="med"/>
-                      <a:tailEnd type="none" w="med" len="med"/>
-                    </a:lnB>
-                  </a:tcPr>
-                </a:tc>
-                <a:tc>
-                  <a:txBody>
-                    <a:bodyPr/>
-                    <a:lstStyle/>
-                    <a:p>
-                      <a:pPr algn="r" fontAlgn="b"/>
-                      <a:r>
-                        <a:rPr lang="en-MY" sz="900" b="0" i="0" u="none" strike="noStrike">
-                          <a:solidFill>
-                            <a:srgbClr val="000000"/>
-                          </a:solidFill>
-                          <a:effectLst/>
-                          <a:latin typeface="Calibri" panose="020F0502020204030204" pitchFamily="34" charset="0"/>
-                        </a:rPr>
-                        <a:t>0.798507</a:t>
-                      </a:r>
-                    </a:p>
-                  </a:txBody>
-                  <a:tcPr marL="9525" marR="9525" marT="9525" marB="0" anchor="b">
-                    <a:lnL w="12700" cap="flat" cmpd="sng" algn="ctr">
-                      <a:solidFill>
-                        <a:schemeClr val="tx1"/>
-                      </a:solidFill>
-                      <a:prstDash val="solid"/>
-                      <a:round/>
-                      <a:headEnd type="none" w="med" len="med"/>
-                      <a:tailEnd type="none" w="med" len="med"/>
-                    </a:lnL>
-                    <a:lnR w="12700" cap="flat" cmpd="sng" algn="ctr">
-                      <a:solidFill>
-                        <a:schemeClr val="tx1"/>
-                      </a:solidFill>
-                      <a:prstDash val="solid"/>
-                      <a:round/>
-                      <a:headEnd type="none" w="med" len="med"/>
-                      <a:tailEnd type="none" w="med" len="med"/>
-                    </a:lnR>
-                    <a:lnT w="12700" cap="flat" cmpd="sng" algn="ctr">
-                      <a:solidFill>
-                        <a:schemeClr val="tx1"/>
-                      </a:solidFill>
-                      <a:prstDash val="solid"/>
-                      <a:round/>
-                      <a:headEnd type="none" w="med" len="med"/>
-                      <a:tailEnd type="none" w="med" len="med"/>
-                    </a:lnT>
-                    <a:lnB w="12700" cap="flat" cmpd="sng" algn="ctr">
-                      <a:solidFill>
-                        <a:schemeClr val="tx1"/>
-                      </a:solidFill>
-                      <a:prstDash val="solid"/>
-                      <a:round/>
-                      <a:headEnd type="none" w="med" len="med"/>
-                      <a:tailEnd type="none" w="med" len="med"/>
-                    </a:lnB>
-                  </a:tcPr>
-                </a:tc>
-                <a:tc>
-                  <a:txBody>
-                    <a:bodyPr/>
-                    <a:lstStyle/>
-                    <a:p>
-                      <a:pPr algn="r" fontAlgn="b"/>
-                      <a:r>
-                        <a:rPr lang="en-MY" sz="900" b="0" i="0" u="none" strike="noStrike">
-                          <a:solidFill>
-                            <a:srgbClr val="000000"/>
-                          </a:solidFill>
-                          <a:effectLst/>
-                          <a:latin typeface="Calibri" panose="020F0502020204030204" pitchFamily="34" charset="0"/>
-                        </a:rPr>
-                        <a:t>56</a:t>
-                      </a:r>
-                    </a:p>
-                  </a:txBody>
-                  <a:tcPr marL="9525" marR="9525" marT="9525" marB="0" anchor="b">
-                    <a:lnL w="12700" cap="flat" cmpd="sng" algn="ctr">
-                      <a:solidFill>
-                        <a:schemeClr val="tx1"/>
-                      </a:solidFill>
-                      <a:prstDash val="solid"/>
-                      <a:round/>
-                      <a:headEnd type="none" w="med" len="med"/>
-                      <a:tailEnd type="none" w="med" len="med"/>
-                    </a:lnL>
-                    <a:lnR w="12700" cap="flat" cmpd="sng" algn="ctr">
-                      <a:solidFill>
-                        <a:schemeClr val="tx1"/>
-                      </a:solidFill>
-                      <a:prstDash val="solid"/>
-                      <a:round/>
-                      <a:headEnd type="none" w="med" len="med"/>
-                      <a:tailEnd type="none" w="med" len="med"/>
-                    </a:lnR>
-                    <a:lnT w="12700" cap="flat" cmpd="sng" algn="ctr">
-                      <a:solidFill>
-                        <a:schemeClr val="tx1"/>
-                      </a:solidFill>
-                      <a:prstDash val="solid"/>
-                      <a:round/>
-                      <a:headEnd type="none" w="med" len="med"/>
-                      <a:tailEnd type="none" w="med" len="med"/>
-                    </a:lnT>
-                    <a:lnB w="12700" cap="flat" cmpd="sng" algn="ctr">
-                      <a:solidFill>
-                        <a:schemeClr val="tx1"/>
-                      </a:solidFill>
-                      <a:prstDash val="solid"/>
-                      <a:round/>
-                      <a:headEnd type="none" w="med" len="med"/>
-                      <a:tailEnd type="none" w="med" len="med"/>
-                    </a:lnB>
-                  </a:tcPr>
-                </a:tc>
-                <a:tc>
-                  <a:txBody>
-                    <a:bodyPr/>
-                    <a:lstStyle/>
-                    <a:p>
-                      <a:pPr algn="r" fontAlgn="b"/>
-                      <a:r>
-                        <a:rPr lang="en-MY" sz="900" b="0" i="0" u="none" strike="noStrike">
-                          <a:solidFill>
-                            <a:srgbClr val="000000"/>
-                          </a:solidFill>
-                          <a:effectLst/>
-                          <a:latin typeface="Calibri" panose="020F0502020204030204" pitchFamily="34" charset="0"/>
-                        </a:rPr>
-                        <a:t>52</a:t>
-                      </a:r>
-                    </a:p>
-                  </a:txBody>
-                  <a:tcPr marL="9525" marR="9525" marT="9525" marB="0" anchor="b">
-                    <a:lnL w="12700" cap="flat" cmpd="sng" algn="ctr">
-                      <a:solidFill>
-                        <a:schemeClr val="tx1"/>
-                      </a:solidFill>
-                      <a:prstDash val="solid"/>
-                      <a:round/>
-                      <a:headEnd type="none" w="med" len="med"/>
-                      <a:tailEnd type="none" w="med" len="med"/>
-                    </a:lnL>
-                    <a:lnR w="12700" cap="flat" cmpd="sng" algn="ctr">
-                      <a:solidFill>
-                        <a:schemeClr val="tx1"/>
-                      </a:solidFill>
-                      <a:prstDash val="solid"/>
-                      <a:round/>
-                      <a:headEnd type="none" w="med" len="med"/>
-                      <a:tailEnd type="none" w="med" len="med"/>
-                    </a:lnR>
-                    <a:lnT w="12700" cap="flat" cmpd="sng" algn="ctr">
-                      <a:solidFill>
-                        <a:schemeClr val="tx1"/>
-                      </a:solidFill>
-                      <a:prstDash val="solid"/>
-                      <a:round/>
-                      <a:headEnd type="none" w="med" len="med"/>
-                      <a:tailEnd type="none" w="med" len="med"/>
-                    </a:lnT>
-                    <a:lnB w="12700" cap="flat" cmpd="sng" algn="ctr">
-                      <a:solidFill>
-                        <a:schemeClr val="tx1"/>
-                      </a:solidFill>
-                      <a:prstDash val="solid"/>
-                      <a:round/>
-                      <a:headEnd type="none" w="med" len="med"/>
-                      <a:tailEnd type="none" w="med" len="med"/>
-                    </a:lnB>
-                  </a:tcPr>
-                </a:tc>
-                <a:tc>
-                  <a:txBody>
-                    <a:bodyPr/>
-                    <a:lstStyle/>
-                    <a:p>
-                      <a:pPr algn="r" fontAlgn="b"/>
-                      <a:r>
-                        <a:rPr lang="en-MY" sz="900" b="0" i="0" u="none" strike="noStrike">
-                          <a:solidFill>
-                            <a:srgbClr val="000000"/>
-                          </a:solidFill>
-                          <a:effectLst/>
-                          <a:latin typeface="Calibri" panose="020F0502020204030204" pitchFamily="34" charset="0"/>
-                        </a:rPr>
-                        <a:t>214</a:t>
-                      </a:r>
-                    </a:p>
-                  </a:txBody>
-                  <a:tcPr marL="9525" marR="9525" marT="9525" marB="0" anchor="b">
-                    <a:lnL w="12700" cap="flat" cmpd="sng" algn="ctr">
-                      <a:solidFill>
-                        <a:schemeClr val="tx1"/>
-                      </a:solidFill>
-                      <a:prstDash val="solid"/>
-                      <a:round/>
-                      <a:headEnd type="none" w="med" len="med"/>
-                      <a:tailEnd type="none" w="med" len="med"/>
-                    </a:lnL>
-                    <a:lnR w="12700" cap="flat" cmpd="sng" algn="ctr">
-                      <a:solidFill>
-                        <a:schemeClr val="tx1"/>
-                      </a:solidFill>
-                      <a:prstDash val="solid"/>
-                      <a:round/>
-                      <a:headEnd type="none" w="med" len="med"/>
-                      <a:tailEnd type="none" w="med" len="med"/>
-                    </a:lnR>
-                    <a:lnT w="12700" cap="flat" cmpd="sng" algn="ctr">
-                      <a:solidFill>
-                        <a:schemeClr val="tx1"/>
-                      </a:solidFill>
-                      <a:prstDash val="solid"/>
-                      <a:round/>
-                      <a:headEnd type="none" w="med" len="med"/>
-                      <a:tailEnd type="none" w="med" len="med"/>
-                    </a:lnT>
-                    <a:lnB w="12700" cap="flat" cmpd="sng" algn="ctr">
-                      <a:solidFill>
-                        <a:schemeClr val="tx1"/>
-                      </a:solidFill>
-                      <a:prstDash val="solid"/>
-                      <a:round/>
-                      <a:headEnd type="none" w="med" len="med"/>
-                      <a:tailEnd type="none" w="med" len="med"/>
-                    </a:lnB>
-                  </a:tcPr>
-                </a:tc>
-                <a:tc>
-                  <a:txBody>
-                    <a:bodyPr/>
-                    <a:lstStyle/>
-                    <a:p>
-                      <a:pPr algn="r" fontAlgn="b"/>
-                      <a:r>
-                        <a:rPr lang="en-MY" sz="900" b="0" i="0" u="none" strike="noStrike">
-                          <a:solidFill>
-                            <a:srgbClr val="000000"/>
-                          </a:solidFill>
-                          <a:effectLst/>
-                          <a:latin typeface="Calibri" panose="020F0502020204030204" pitchFamily="34" charset="0"/>
-                        </a:rPr>
-                        <a:t>-1310000</a:t>
                       </a:r>
                     </a:p>
                   </a:txBody>
@@ -16002,6 +16030,814 @@
                           <a:effectLst/>
                           <a:latin typeface="Calibri" panose="020F0502020204030204" pitchFamily="34" charset="0"/>
                         </a:rPr>
+                        <a:t>LightGBMGridSearch</a:t>
+                      </a:r>
+                    </a:p>
+                  </a:txBody>
+                  <a:tcPr marL="9525" marR="9525" marT="9525" marB="0" anchor="b">
+                    <a:lnL w="12700" cap="flat" cmpd="sng" algn="ctr">
+                      <a:solidFill>
+                        <a:schemeClr val="tx1"/>
+                      </a:solidFill>
+                      <a:prstDash val="solid"/>
+                      <a:round/>
+                      <a:headEnd type="none" w="med" len="med"/>
+                      <a:tailEnd type="none" w="med" len="med"/>
+                    </a:lnL>
+                    <a:lnR w="12700" cap="flat" cmpd="sng" algn="ctr">
+                      <a:solidFill>
+                        <a:schemeClr val="tx1"/>
+                      </a:solidFill>
+                      <a:prstDash val="solid"/>
+                      <a:round/>
+                      <a:headEnd type="none" w="med" len="med"/>
+                      <a:tailEnd type="none" w="med" len="med"/>
+                    </a:lnR>
+                    <a:lnT w="12700" cap="flat" cmpd="sng" algn="ctr">
+                      <a:solidFill>
+                        <a:schemeClr val="tx1"/>
+                      </a:solidFill>
+                      <a:prstDash val="solid"/>
+                      <a:round/>
+                      <a:headEnd type="none" w="med" len="med"/>
+                      <a:tailEnd type="none" w="med" len="med"/>
+                    </a:lnT>
+                    <a:lnB w="12700" cap="flat" cmpd="sng" algn="ctr">
+                      <a:solidFill>
+                        <a:schemeClr val="tx1"/>
+                      </a:solidFill>
+                      <a:prstDash val="solid"/>
+                      <a:round/>
+                      <a:headEnd type="none" w="med" len="med"/>
+                      <a:tailEnd type="none" w="med" len="med"/>
+                    </a:lnB>
+                    <a:solidFill>
+                      <a:srgbClr val="FFC000"/>
+                    </a:solidFill>
+                  </a:tcPr>
+                </a:tc>
+                <a:tc>
+                  <a:txBody>
+                    <a:bodyPr/>
+                    <a:lstStyle/>
+                    <a:p>
+                      <a:pPr algn="r" fontAlgn="b"/>
+                      <a:r>
+                        <a:rPr lang="en-MY" sz="900" b="0" i="0" u="none" strike="noStrike">
+                          <a:solidFill>
+                            <a:srgbClr val="000000"/>
+                          </a:solidFill>
+                          <a:effectLst/>
+                          <a:latin typeface="Calibri" panose="020F0502020204030204" pitchFamily="34" charset="0"/>
+                        </a:rPr>
+                        <a:t>0.999914</a:t>
+                      </a:r>
+                    </a:p>
+                  </a:txBody>
+                  <a:tcPr marL="9525" marR="9525" marT="9525" marB="0" anchor="b">
+                    <a:lnL w="12700" cap="flat" cmpd="sng" algn="ctr">
+                      <a:solidFill>
+                        <a:schemeClr val="tx1"/>
+                      </a:solidFill>
+                      <a:prstDash val="solid"/>
+                      <a:round/>
+                      <a:headEnd type="none" w="med" len="med"/>
+                      <a:tailEnd type="none" w="med" len="med"/>
+                    </a:lnL>
+                    <a:lnR w="12700" cap="flat" cmpd="sng" algn="ctr">
+                      <a:solidFill>
+                        <a:schemeClr val="tx1"/>
+                      </a:solidFill>
+                      <a:prstDash val="solid"/>
+                      <a:round/>
+                      <a:headEnd type="none" w="med" len="med"/>
+                      <a:tailEnd type="none" w="med" len="med"/>
+                    </a:lnR>
+                    <a:lnT w="12700" cap="flat" cmpd="sng" algn="ctr">
+                      <a:solidFill>
+                        <a:schemeClr val="tx1"/>
+                      </a:solidFill>
+                      <a:prstDash val="solid"/>
+                      <a:round/>
+                      <a:headEnd type="none" w="med" len="med"/>
+                      <a:tailEnd type="none" w="med" len="med"/>
+                    </a:lnT>
+                    <a:lnB w="12700" cap="flat" cmpd="sng" algn="ctr">
+                      <a:solidFill>
+                        <a:schemeClr val="tx1"/>
+                      </a:solidFill>
+                      <a:prstDash val="solid"/>
+                      <a:round/>
+                      <a:headEnd type="none" w="med" len="med"/>
+                      <a:tailEnd type="none" w="med" len="med"/>
+                    </a:lnB>
+                  </a:tcPr>
+                </a:tc>
+                <a:tc>
+                  <a:txBody>
+                    <a:bodyPr/>
+                    <a:lstStyle/>
+                    <a:p>
+                      <a:pPr algn="r" fontAlgn="b"/>
+                      <a:r>
+                        <a:rPr lang="en-MY" sz="900" b="0" i="0" u="none" strike="noStrike">
+                          <a:solidFill>
+                            <a:srgbClr val="000000"/>
+                          </a:solidFill>
+                          <a:effectLst/>
+                          <a:latin typeface="Calibri" panose="020F0502020204030204" pitchFamily="34" charset="0"/>
+                        </a:rPr>
+                        <a:t>0.892537</a:t>
+                      </a:r>
+                    </a:p>
+                  </a:txBody>
+                  <a:tcPr marL="9525" marR="9525" marT="9525" marB="0" anchor="b">
+                    <a:lnL w="12700" cap="flat" cmpd="sng" algn="ctr">
+                      <a:solidFill>
+                        <a:schemeClr val="tx1"/>
+                      </a:solidFill>
+                      <a:prstDash val="solid"/>
+                      <a:round/>
+                      <a:headEnd type="none" w="med" len="med"/>
+                      <a:tailEnd type="none" w="med" len="med"/>
+                    </a:lnL>
+                    <a:lnR w="12700" cap="flat" cmpd="sng" algn="ctr">
+                      <a:solidFill>
+                        <a:schemeClr val="tx1"/>
+                      </a:solidFill>
+                      <a:prstDash val="solid"/>
+                      <a:round/>
+                      <a:headEnd type="none" w="med" len="med"/>
+                      <a:tailEnd type="none" w="med" len="med"/>
+                    </a:lnR>
+                    <a:lnT w="12700" cap="flat" cmpd="sng" algn="ctr">
+                      <a:solidFill>
+                        <a:schemeClr val="tx1"/>
+                      </a:solidFill>
+                      <a:prstDash val="solid"/>
+                      <a:round/>
+                      <a:headEnd type="none" w="med" len="med"/>
+                      <a:tailEnd type="none" w="med" len="med"/>
+                    </a:lnT>
+                    <a:lnB w="12700" cap="flat" cmpd="sng" algn="ctr">
+                      <a:solidFill>
+                        <a:schemeClr val="tx1"/>
+                      </a:solidFill>
+                      <a:prstDash val="solid"/>
+                      <a:round/>
+                      <a:headEnd type="none" w="med" len="med"/>
+                      <a:tailEnd type="none" w="med" len="med"/>
+                    </a:lnB>
+                  </a:tcPr>
+                </a:tc>
+                <a:tc>
+                  <a:txBody>
+                    <a:bodyPr/>
+                    <a:lstStyle/>
+                    <a:p>
+                      <a:pPr algn="r" fontAlgn="b"/>
+                      <a:r>
+                        <a:rPr lang="en-MY" sz="900" b="0" i="0" u="none" strike="noStrike">
+                          <a:solidFill>
+                            <a:srgbClr val="000000"/>
+                          </a:solidFill>
+                          <a:effectLst/>
+                          <a:latin typeface="Calibri" panose="020F0502020204030204" pitchFamily="34" charset="0"/>
+                        </a:rPr>
+                        <a:t>0.999914</a:t>
+                      </a:r>
+                    </a:p>
+                  </a:txBody>
+                  <a:tcPr marL="9525" marR="9525" marT="9525" marB="0" anchor="b">
+                    <a:lnL w="12700" cap="flat" cmpd="sng" algn="ctr">
+                      <a:solidFill>
+                        <a:schemeClr val="tx1"/>
+                      </a:solidFill>
+                      <a:prstDash val="solid"/>
+                      <a:round/>
+                      <a:headEnd type="none" w="med" len="med"/>
+                      <a:tailEnd type="none" w="med" len="med"/>
+                    </a:lnL>
+                    <a:lnR w="12700" cap="flat" cmpd="sng" algn="ctr">
+                      <a:solidFill>
+                        <a:schemeClr val="tx1"/>
+                      </a:solidFill>
+                      <a:prstDash val="solid"/>
+                      <a:round/>
+                      <a:headEnd type="none" w="med" len="med"/>
+                      <a:tailEnd type="none" w="med" len="med"/>
+                    </a:lnR>
+                    <a:lnT w="12700" cap="flat" cmpd="sng" algn="ctr">
+                      <a:solidFill>
+                        <a:schemeClr val="tx1"/>
+                      </a:solidFill>
+                      <a:prstDash val="solid"/>
+                      <a:round/>
+                      <a:headEnd type="none" w="med" len="med"/>
+                      <a:tailEnd type="none" w="med" len="med"/>
+                    </a:lnT>
+                    <a:lnB w="12700" cap="flat" cmpd="sng" algn="ctr">
+                      <a:solidFill>
+                        <a:schemeClr val="tx1"/>
+                      </a:solidFill>
+                      <a:prstDash val="solid"/>
+                      <a:round/>
+                      <a:headEnd type="none" w="med" len="med"/>
+                      <a:tailEnd type="none" w="med" len="med"/>
+                    </a:lnB>
+                  </a:tcPr>
+                </a:tc>
+                <a:tc>
+                  <a:txBody>
+                    <a:bodyPr/>
+                    <a:lstStyle/>
+                    <a:p>
+                      <a:pPr algn="r" fontAlgn="b"/>
+                      <a:r>
+                        <a:rPr lang="en-MY" sz="900" b="0" i="0" u="none" strike="noStrike">
+                          <a:solidFill>
+                            <a:srgbClr val="000000"/>
+                          </a:solidFill>
+                          <a:effectLst/>
+                          <a:latin typeface="Calibri" panose="020F0502020204030204" pitchFamily="34" charset="0"/>
+                        </a:rPr>
+                        <a:t>0.965682</a:t>
+                      </a:r>
+                    </a:p>
+                  </a:txBody>
+                  <a:tcPr marL="9525" marR="9525" marT="9525" marB="0" anchor="b">
+                    <a:lnL w="12700" cap="flat" cmpd="sng" algn="ctr">
+                      <a:solidFill>
+                        <a:schemeClr val="tx1"/>
+                      </a:solidFill>
+                      <a:prstDash val="solid"/>
+                      <a:round/>
+                      <a:headEnd type="none" w="med" len="med"/>
+                      <a:tailEnd type="none" w="med" len="med"/>
+                    </a:lnL>
+                    <a:lnR w="12700" cap="flat" cmpd="sng" algn="ctr">
+                      <a:solidFill>
+                        <a:schemeClr val="tx1"/>
+                      </a:solidFill>
+                      <a:prstDash val="solid"/>
+                      <a:round/>
+                      <a:headEnd type="none" w="med" len="med"/>
+                      <a:tailEnd type="none" w="med" len="med"/>
+                    </a:lnR>
+                    <a:lnT w="12700" cap="flat" cmpd="sng" algn="ctr">
+                      <a:solidFill>
+                        <a:schemeClr val="tx1"/>
+                      </a:solidFill>
+                      <a:prstDash val="solid"/>
+                      <a:round/>
+                      <a:headEnd type="none" w="med" len="med"/>
+                      <a:tailEnd type="none" w="med" len="med"/>
+                    </a:lnT>
+                    <a:lnB w="12700" cap="flat" cmpd="sng" algn="ctr">
+                      <a:solidFill>
+                        <a:schemeClr val="tx1"/>
+                      </a:solidFill>
+                      <a:prstDash val="solid"/>
+                      <a:round/>
+                      <a:headEnd type="none" w="med" len="med"/>
+                      <a:tailEnd type="none" w="med" len="med"/>
+                    </a:lnB>
+                  </a:tcPr>
+                </a:tc>
+                <a:tc>
+                  <a:txBody>
+                    <a:bodyPr/>
+                    <a:lstStyle/>
+                    <a:p>
+                      <a:pPr algn="r" fontAlgn="b"/>
+                      <a:r>
+                        <a:rPr lang="en-MY" sz="900" b="0" i="0" u="none" strike="noStrike">
+                          <a:solidFill>
+                            <a:srgbClr val="000000"/>
+                          </a:solidFill>
+                          <a:effectLst/>
+                          <a:latin typeface="Calibri" panose="020F0502020204030204" pitchFamily="34" charset="0"/>
+                        </a:rPr>
+                        <a:t>0.999827</a:t>
+                      </a:r>
+                    </a:p>
+                  </a:txBody>
+                  <a:tcPr marL="9525" marR="9525" marT="9525" marB="0" anchor="b">
+                    <a:lnL w="12700" cap="flat" cmpd="sng" algn="ctr">
+                      <a:solidFill>
+                        <a:schemeClr val="tx1"/>
+                      </a:solidFill>
+                      <a:prstDash val="solid"/>
+                      <a:round/>
+                      <a:headEnd type="none" w="med" len="med"/>
+                      <a:tailEnd type="none" w="med" len="med"/>
+                    </a:lnL>
+                    <a:lnR w="12700" cap="flat" cmpd="sng" algn="ctr">
+                      <a:solidFill>
+                        <a:schemeClr val="tx1"/>
+                      </a:solidFill>
+                      <a:prstDash val="solid"/>
+                      <a:round/>
+                      <a:headEnd type="none" w="med" len="med"/>
+                      <a:tailEnd type="none" w="med" len="med"/>
+                    </a:lnR>
+                    <a:lnT w="12700" cap="flat" cmpd="sng" algn="ctr">
+                      <a:solidFill>
+                        <a:schemeClr val="tx1"/>
+                      </a:solidFill>
+                      <a:prstDash val="solid"/>
+                      <a:round/>
+                      <a:headEnd type="none" w="med" len="med"/>
+                      <a:tailEnd type="none" w="med" len="med"/>
+                    </a:lnT>
+                    <a:lnB w="12700" cap="flat" cmpd="sng" algn="ctr">
+                      <a:solidFill>
+                        <a:schemeClr val="tx1"/>
+                      </a:solidFill>
+                      <a:prstDash val="solid"/>
+                      <a:round/>
+                      <a:headEnd type="none" w="med" len="med"/>
+                      <a:tailEnd type="none" w="med" len="med"/>
+                    </a:lnB>
+                  </a:tcPr>
+                </a:tc>
+                <a:tc>
+                  <a:txBody>
+                    <a:bodyPr/>
+                    <a:lstStyle/>
+                    <a:p>
+                      <a:pPr algn="r" fontAlgn="b"/>
+                      <a:r>
+                        <a:rPr lang="en-MY" sz="900" b="0" i="0" u="none" strike="noStrike" dirty="0">
+                          <a:solidFill>
+                            <a:srgbClr val="000000"/>
+                          </a:solidFill>
+                          <a:effectLst/>
+                          <a:latin typeface="Calibri" panose="020F0502020204030204" pitchFamily="34" charset="0"/>
+                        </a:rPr>
+                        <a:t>0.779778</a:t>
+                      </a:r>
+                    </a:p>
+                  </a:txBody>
+                  <a:tcPr marL="9525" marR="9525" marT="9525" marB="0" anchor="b">
+                    <a:lnL w="12700" cap="flat" cmpd="sng" algn="ctr">
+                      <a:solidFill>
+                        <a:schemeClr val="tx1"/>
+                      </a:solidFill>
+                      <a:prstDash val="solid"/>
+                      <a:round/>
+                      <a:headEnd type="none" w="med" len="med"/>
+                      <a:tailEnd type="none" w="med" len="med"/>
+                    </a:lnL>
+                    <a:lnR w="12700" cap="flat" cmpd="sng" algn="ctr">
+                      <a:solidFill>
+                        <a:schemeClr val="tx1"/>
+                      </a:solidFill>
+                      <a:prstDash val="solid"/>
+                      <a:round/>
+                      <a:headEnd type="none" w="med" len="med"/>
+                      <a:tailEnd type="none" w="med" len="med"/>
+                    </a:lnR>
+                    <a:lnT w="12700" cap="flat" cmpd="sng" algn="ctr">
+                      <a:solidFill>
+                        <a:schemeClr val="tx1"/>
+                      </a:solidFill>
+                      <a:prstDash val="solid"/>
+                      <a:round/>
+                      <a:headEnd type="none" w="med" len="med"/>
+                      <a:tailEnd type="none" w="med" len="med"/>
+                    </a:lnT>
+                    <a:lnB w="12700" cap="flat" cmpd="sng" algn="ctr">
+                      <a:solidFill>
+                        <a:schemeClr val="tx1"/>
+                      </a:solidFill>
+                      <a:prstDash val="solid"/>
+                      <a:round/>
+                      <a:headEnd type="none" w="med" len="med"/>
+                      <a:tailEnd type="none" w="med" len="med"/>
+                    </a:lnB>
+                  </a:tcPr>
+                </a:tc>
+                <a:tc>
+                  <a:txBody>
+                    <a:bodyPr/>
+                    <a:lstStyle/>
+                    <a:p>
+                      <a:pPr algn="r" fontAlgn="b"/>
+                      <a:r>
+                        <a:rPr lang="en-MY" sz="900" b="0" i="0" u="none" strike="noStrike" dirty="0">
+                          <a:solidFill>
+                            <a:srgbClr val="000000"/>
+                          </a:solidFill>
+                          <a:effectLst/>
+                          <a:latin typeface="Calibri" panose="020F0502020204030204" pitchFamily="34" charset="0"/>
+                        </a:rPr>
+                        <a:t>0.999914</a:t>
+                      </a:r>
+                    </a:p>
+                  </a:txBody>
+                  <a:tcPr marL="9525" marR="9525" marT="9525" marB="0" anchor="b">
+                    <a:lnL w="12700" cap="flat" cmpd="sng" algn="ctr">
+                      <a:solidFill>
+                        <a:schemeClr val="tx1"/>
+                      </a:solidFill>
+                      <a:prstDash val="solid"/>
+                      <a:round/>
+                      <a:headEnd type="none" w="med" len="med"/>
+                      <a:tailEnd type="none" w="med" len="med"/>
+                    </a:lnL>
+                    <a:lnR w="12700" cap="flat" cmpd="sng" algn="ctr">
+                      <a:solidFill>
+                        <a:schemeClr val="tx1"/>
+                      </a:solidFill>
+                      <a:prstDash val="solid"/>
+                      <a:round/>
+                      <a:headEnd type="none" w="med" len="med"/>
+                      <a:tailEnd type="none" w="med" len="med"/>
+                    </a:lnR>
+                    <a:lnT w="12700" cap="flat" cmpd="sng" algn="ctr">
+                      <a:solidFill>
+                        <a:schemeClr val="tx1"/>
+                      </a:solidFill>
+                      <a:prstDash val="solid"/>
+                      <a:round/>
+                      <a:headEnd type="none" w="med" len="med"/>
+                      <a:tailEnd type="none" w="med" len="med"/>
+                    </a:lnT>
+                    <a:lnB w="12700" cap="flat" cmpd="sng" algn="ctr">
+                      <a:solidFill>
+                        <a:schemeClr val="tx1"/>
+                      </a:solidFill>
+                      <a:prstDash val="solid"/>
+                      <a:round/>
+                      <a:headEnd type="none" w="med" len="med"/>
+                      <a:tailEnd type="none" w="med" len="med"/>
+                    </a:lnB>
+                  </a:tcPr>
+                </a:tc>
+                <a:tc>
+                  <a:txBody>
+                    <a:bodyPr/>
+                    <a:lstStyle/>
+                    <a:p>
+                      <a:pPr algn="r" fontAlgn="b"/>
+                      <a:r>
+                        <a:rPr lang="en-MY" sz="900" b="0" i="0" u="none" strike="noStrike">
+                          <a:solidFill>
+                            <a:srgbClr val="000000"/>
+                          </a:solidFill>
+                          <a:effectLst/>
+                          <a:latin typeface="Calibri" panose="020F0502020204030204" pitchFamily="34" charset="0"/>
+                        </a:rPr>
+                        <a:t>0.798507</a:t>
+                      </a:r>
+                    </a:p>
+                  </a:txBody>
+                  <a:tcPr marL="9525" marR="9525" marT="9525" marB="0" anchor="b">
+                    <a:lnL w="12700" cap="flat" cmpd="sng" algn="ctr">
+                      <a:solidFill>
+                        <a:schemeClr val="tx1"/>
+                      </a:solidFill>
+                      <a:prstDash val="solid"/>
+                      <a:round/>
+                      <a:headEnd type="none" w="med" len="med"/>
+                      <a:tailEnd type="none" w="med" len="med"/>
+                    </a:lnL>
+                    <a:lnR w="12700" cap="flat" cmpd="sng" algn="ctr">
+                      <a:solidFill>
+                        <a:schemeClr val="tx1"/>
+                      </a:solidFill>
+                      <a:prstDash val="solid"/>
+                      <a:round/>
+                      <a:headEnd type="none" w="med" len="med"/>
+                      <a:tailEnd type="none" w="med" len="med"/>
+                    </a:lnR>
+                    <a:lnT w="12700" cap="flat" cmpd="sng" algn="ctr">
+                      <a:solidFill>
+                        <a:schemeClr val="tx1"/>
+                      </a:solidFill>
+                      <a:prstDash val="solid"/>
+                      <a:round/>
+                      <a:headEnd type="none" w="med" len="med"/>
+                      <a:tailEnd type="none" w="med" len="med"/>
+                    </a:lnT>
+                    <a:lnB w="12700" cap="flat" cmpd="sng" algn="ctr">
+                      <a:solidFill>
+                        <a:schemeClr val="tx1"/>
+                      </a:solidFill>
+                      <a:prstDash val="solid"/>
+                      <a:round/>
+                      <a:headEnd type="none" w="med" len="med"/>
+                      <a:tailEnd type="none" w="med" len="med"/>
+                    </a:lnB>
+                  </a:tcPr>
+                </a:tc>
+                <a:tc>
+                  <a:txBody>
+                    <a:bodyPr/>
+                    <a:lstStyle/>
+                    <a:p>
+                      <a:pPr algn="r" fontAlgn="b"/>
+                      <a:r>
+                        <a:rPr lang="en-MY" sz="900" b="0" i="0" u="none" strike="noStrike">
+                          <a:solidFill>
+                            <a:srgbClr val="000000"/>
+                          </a:solidFill>
+                          <a:effectLst/>
+                          <a:latin typeface="Calibri" panose="020F0502020204030204" pitchFamily="34" charset="0"/>
+                        </a:rPr>
+                        <a:t>56</a:t>
+                      </a:r>
+                    </a:p>
+                  </a:txBody>
+                  <a:tcPr marL="9525" marR="9525" marT="9525" marB="0" anchor="b">
+                    <a:lnL w="12700" cap="flat" cmpd="sng" algn="ctr">
+                      <a:solidFill>
+                        <a:schemeClr val="tx1"/>
+                      </a:solidFill>
+                      <a:prstDash val="solid"/>
+                      <a:round/>
+                      <a:headEnd type="none" w="med" len="med"/>
+                      <a:tailEnd type="none" w="med" len="med"/>
+                    </a:lnL>
+                    <a:lnR w="12700" cap="flat" cmpd="sng" algn="ctr">
+                      <a:solidFill>
+                        <a:schemeClr val="tx1"/>
+                      </a:solidFill>
+                      <a:prstDash val="solid"/>
+                      <a:round/>
+                      <a:headEnd type="none" w="med" len="med"/>
+                      <a:tailEnd type="none" w="med" len="med"/>
+                    </a:lnR>
+                    <a:lnT w="12700" cap="flat" cmpd="sng" algn="ctr">
+                      <a:solidFill>
+                        <a:schemeClr val="tx1"/>
+                      </a:solidFill>
+                      <a:prstDash val="solid"/>
+                      <a:round/>
+                      <a:headEnd type="none" w="med" len="med"/>
+                      <a:tailEnd type="none" w="med" len="med"/>
+                    </a:lnT>
+                    <a:lnB w="12700" cap="flat" cmpd="sng" algn="ctr">
+                      <a:solidFill>
+                        <a:schemeClr val="tx1"/>
+                      </a:solidFill>
+                      <a:prstDash val="solid"/>
+                      <a:round/>
+                      <a:headEnd type="none" w="med" len="med"/>
+                      <a:tailEnd type="none" w="med" len="med"/>
+                    </a:lnB>
+                  </a:tcPr>
+                </a:tc>
+                <a:tc>
+                  <a:txBody>
+                    <a:bodyPr/>
+                    <a:lstStyle/>
+                    <a:p>
+                      <a:pPr algn="r" fontAlgn="b"/>
+                      <a:r>
+                        <a:rPr lang="en-MY" sz="900" b="0" i="0" u="none" strike="noStrike">
+                          <a:solidFill>
+                            <a:srgbClr val="000000"/>
+                          </a:solidFill>
+                          <a:effectLst/>
+                          <a:latin typeface="Calibri" panose="020F0502020204030204" pitchFamily="34" charset="0"/>
+                        </a:rPr>
+                        <a:t>52</a:t>
+                      </a:r>
+                    </a:p>
+                  </a:txBody>
+                  <a:tcPr marL="9525" marR="9525" marT="9525" marB="0" anchor="b">
+                    <a:lnL w="12700" cap="flat" cmpd="sng" algn="ctr">
+                      <a:solidFill>
+                        <a:schemeClr val="tx1"/>
+                      </a:solidFill>
+                      <a:prstDash val="solid"/>
+                      <a:round/>
+                      <a:headEnd type="none" w="med" len="med"/>
+                      <a:tailEnd type="none" w="med" len="med"/>
+                    </a:lnL>
+                    <a:lnR w="12700" cap="flat" cmpd="sng" algn="ctr">
+                      <a:solidFill>
+                        <a:schemeClr val="tx1"/>
+                      </a:solidFill>
+                      <a:prstDash val="solid"/>
+                      <a:round/>
+                      <a:headEnd type="none" w="med" len="med"/>
+                      <a:tailEnd type="none" w="med" len="med"/>
+                    </a:lnR>
+                    <a:lnT w="12700" cap="flat" cmpd="sng" algn="ctr">
+                      <a:solidFill>
+                        <a:schemeClr val="tx1"/>
+                      </a:solidFill>
+                      <a:prstDash val="solid"/>
+                      <a:round/>
+                      <a:headEnd type="none" w="med" len="med"/>
+                      <a:tailEnd type="none" w="med" len="med"/>
+                    </a:lnT>
+                    <a:lnB w="12700" cap="flat" cmpd="sng" algn="ctr">
+                      <a:solidFill>
+                        <a:schemeClr val="tx1"/>
+                      </a:solidFill>
+                      <a:prstDash val="solid"/>
+                      <a:round/>
+                      <a:headEnd type="none" w="med" len="med"/>
+                      <a:tailEnd type="none" w="med" len="med"/>
+                    </a:lnB>
+                  </a:tcPr>
+                </a:tc>
+                <a:tc>
+                  <a:txBody>
+                    <a:bodyPr/>
+                    <a:lstStyle/>
+                    <a:p>
+                      <a:pPr algn="r" fontAlgn="b"/>
+                      <a:r>
+                        <a:rPr lang="en-MY" sz="900" b="0" i="0" u="none" strike="noStrike">
+                          <a:solidFill>
+                            <a:srgbClr val="000000"/>
+                          </a:solidFill>
+                          <a:effectLst/>
+                          <a:latin typeface="Calibri" panose="020F0502020204030204" pitchFamily="34" charset="0"/>
+                        </a:rPr>
+                        <a:t>214</a:t>
+                      </a:r>
+                    </a:p>
+                  </a:txBody>
+                  <a:tcPr marL="9525" marR="9525" marT="9525" marB="0" anchor="b">
+                    <a:lnL w="12700" cap="flat" cmpd="sng" algn="ctr">
+                      <a:solidFill>
+                        <a:schemeClr val="tx1"/>
+                      </a:solidFill>
+                      <a:prstDash val="solid"/>
+                      <a:round/>
+                      <a:headEnd type="none" w="med" len="med"/>
+                      <a:tailEnd type="none" w="med" len="med"/>
+                    </a:lnL>
+                    <a:lnR w="12700" cap="flat" cmpd="sng" algn="ctr">
+                      <a:solidFill>
+                        <a:schemeClr val="tx1"/>
+                      </a:solidFill>
+                      <a:prstDash val="solid"/>
+                      <a:round/>
+                      <a:headEnd type="none" w="med" len="med"/>
+                      <a:tailEnd type="none" w="med" len="med"/>
+                    </a:lnR>
+                    <a:lnT w="12700" cap="flat" cmpd="sng" algn="ctr">
+                      <a:solidFill>
+                        <a:schemeClr val="tx1"/>
+                      </a:solidFill>
+                      <a:prstDash val="solid"/>
+                      <a:round/>
+                      <a:headEnd type="none" w="med" len="med"/>
+                      <a:tailEnd type="none" w="med" len="med"/>
+                    </a:lnT>
+                    <a:lnB w="12700" cap="flat" cmpd="sng" algn="ctr">
+                      <a:solidFill>
+                        <a:schemeClr val="tx1"/>
+                      </a:solidFill>
+                      <a:prstDash val="solid"/>
+                      <a:round/>
+                      <a:headEnd type="none" w="med" len="med"/>
+                      <a:tailEnd type="none" w="med" len="med"/>
+                    </a:lnB>
+                  </a:tcPr>
+                </a:tc>
+                <a:tc>
+                  <a:txBody>
+                    <a:bodyPr/>
+                    <a:lstStyle/>
+                    <a:p>
+                      <a:pPr algn="r" fontAlgn="b"/>
+                      <a:r>
+                        <a:rPr lang="en-MY" sz="900" b="0" i="0" u="none" strike="noStrike">
+                          <a:solidFill>
+                            <a:srgbClr val="000000"/>
+                          </a:solidFill>
+                          <a:effectLst/>
+                          <a:latin typeface="Calibri" panose="020F0502020204030204" pitchFamily="34" charset="0"/>
+                        </a:rPr>
+                        <a:t>-1310000</a:t>
+                      </a:r>
+                    </a:p>
+                  </a:txBody>
+                  <a:tcPr marL="9525" marR="9525" marT="9525" marB="0" anchor="b">
+                    <a:lnL w="12700" cap="flat" cmpd="sng" algn="ctr">
+                      <a:solidFill>
+                        <a:schemeClr val="tx1"/>
+                      </a:solidFill>
+                      <a:prstDash val="solid"/>
+                      <a:round/>
+                      <a:headEnd type="none" w="med" len="med"/>
+                      <a:tailEnd type="none" w="med" len="med"/>
+                    </a:lnL>
+                    <a:lnR w="12700" cap="flat" cmpd="sng" algn="ctr">
+                      <a:solidFill>
+                        <a:schemeClr val="tx1"/>
+                      </a:solidFill>
+                      <a:prstDash val="solid"/>
+                      <a:round/>
+                      <a:headEnd type="none" w="med" len="med"/>
+                      <a:tailEnd type="none" w="med" len="med"/>
+                    </a:lnR>
+                    <a:lnT w="12700" cap="flat" cmpd="sng" algn="ctr">
+                      <a:solidFill>
+                        <a:schemeClr val="tx1"/>
+                      </a:solidFill>
+                      <a:prstDash val="solid"/>
+                      <a:round/>
+                      <a:headEnd type="none" w="med" len="med"/>
+                      <a:tailEnd type="none" w="med" len="med"/>
+                    </a:lnT>
+                    <a:lnB w="12700" cap="flat" cmpd="sng" algn="ctr">
+                      <a:solidFill>
+                        <a:schemeClr val="tx1"/>
+                      </a:solidFill>
+                      <a:prstDash val="solid"/>
+                      <a:round/>
+                      <a:headEnd type="none" w="med" len="med"/>
+                      <a:tailEnd type="none" w="med" len="med"/>
+                    </a:lnB>
+                  </a:tcPr>
+                </a:tc>
+                <a:tc>
+                  <a:txBody>
+                    <a:bodyPr/>
+                    <a:lstStyle/>
+                    <a:p>
+                      <a:pPr algn="r" fontAlgn="b"/>
+                      <a:r>
+                        <a:rPr lang="en-MY" sz="900" b="0" i="0" u="none" strike="noStrike">
+                          <a:solidFill>
+                            <a:srgbClr val="000000"/>
+                          </a:solidFill>
+                          <a:effectLst/>
+                          <a:latin typeface="Calibri" panose="020F0502020204030204" pitchFamily="34" charset="0"/>
+                        </a:rPr>
+                        <a:t>5</a:t>
+                      </a:r>
+                    </a:p>
+                  </a:txBody>
+                  <a:tcPr marL="9525" marR="9525" marT="9525" marB="0" anchor="b">
+                    <a:lnL w="12700" cap="flat" cmpd="sng" algn="ctr">
+                      <a:solidFill>
+                        <a:schemeClr val="tx1"/>
+                      </a:solidFill>
+                      <a:prstDash val="solid"/>
+                      <a:round/>
+                      <a:headEnd type="none" w="med" len="med"/>
+                      <a:tailEnd type="none" w="med" len="med"/>
+                    </a:lnL>
+                    <a:lnR w="12700" cap="flat" cmpd="sng" algn="ctr">
+                      <a:solidFill>
+                        <a:schemeClr val="tx1"/>
+                      </a:solidFill>
+                      <a:prstDash val="solid"/>
+                      <a:round/>
+                      <a:headEnd type="none" w="med" len="med"/>
+                      <a:tailEnd type="none" w="med" len="med"/>
+                    </a:lnR>
+                    <a:lnT w="12700" cap="flat" cmpd="sng" algn="ctr">
+                      <a:solidFill>
+                        <a:schemeClr val="tx1"/>
+                      </a:solidFill>
+                      <a:prstDash val="solid"/>
+                      <a:round/>
+                      <a:headEnd type="none" w="med" len="med"/>
+                      <a:tailEnd type="none" w="med" len="med"/>
+                    </a:lnT>
+                    <a:lnB w="12700" cap="flat" cmpd="sng" algn="ctr">
+                      <a:solidFill>
+                        <a:schemeClr val="tx1"/>
+                      </a:solidFill>
+                      <a:prstDash val="solid"/>
+                      <a:round/>
+                      <a:headEnd type="none" w="med" len="med"/>
+                      <a:tailEnd type="none" w="med" len="med"/>
+                    </a:lnB>
+                  </a:tcPr>
+                </a:tc>
+                <a:extLst>
+                  <a:ext uri="{0D108BD9-81ED-4DB2-BD59-A6C34878D82A}">
+                    <a16:rowId xmlns:a16="http://schemas.microsoft.com/office/drawing/2014/main" val="3892829912"/>
+                  </a:ext>
+                </a:extLst>
+              </a:tr>
+              <a:tr h="211539">
+                <a:tc>
+                  <a:txBody>
+                    <a:bodyPr/>
+                    <a:lstStyle/>
+                    <a:p>
+                      <a:pPr algn="l" fontAlgn="b"/>
+                      <a:r>
+                        <a:rPr lang="en-MY" sz="900" b="1" i="0" u="none" strike="noStrike" dirty="0">
+                          <a:solidFill>
+                            <a:srgbClr val="000000"/>
+                          </a:solidFill>
+                          <a:effectLst/>
+                          <a:latin typeface="Calibri" panose="020F0502020204030204" pitchFamily="34" charset="0"/>
+                        </a:rPr>
                         <a:t>RandomForestGridSearch</a:t>
                       </a:r>
                     </a:p>
@@ -16044,7 +16880,7 @@
                       <a:tailEnd type="none" w="med" len="med"/>
                     </a:lnB>
                     <a:solidFill>
-                      <a:schemeClr val="accent2">
+                      <a:schemeClr val="accent4">
                         <a:lumMod val="20000"/>
                         <a:lumOff val="80000"/>
                       </a:schemeClr>
@@ -16065,7 +16901,7 @@
                           <a:effectLst/>
                           <a:latin typeface="Calibri" panose="020F0502020204030204" pitchFamily="34" charset="0"/>
                         </a:rPr>
-                        <a:t>0.90139</a:t>
+                        <a:t>0.901822</a:t>
                       </a:r>
                     </a:p>
                   </a:txBody>
@@ -16122,7 +16958,7 @@
                           <a:effectLst/>
                           <a:latin typeface="Calibri" panose="020F0502020204030204" pitchFamily="34" charset="0"/>
                         </a:rPr>
-                        <a:t>0.862974</a:t>
+                        <a:t>0.866734</a:t>
                       </a:r>
                     </a:p>
                   </a:txBody>
@@ -16179,7 +17015,7 @@
                           <a:effectLst/>
                           <a:latin typeface="Calibri" panose="020F0502020204030204" pitchFamily="34" charset="0"/>
                         </a:rPr>
-                        <a:t>0.90139</a:t>
+                        <a:t>0.901822</a:t>
                       </a:r>
                     </a:p>
                   </a:txBody>
@@ -16236,7 +17072,7 @@
                           <a:effectLst/>
                           <a:latin typeface="Calibri" panose="020F0502020204030204" pitchFamily="34" charset="0"/>
                         </a:rPr>
-                        <a:t>0.905307</a:t>
+                        <a:t>0.905942</a:t>
                       </a:r>
                     </a:p>
                   </a:txBody>
@@ -16293,7 +17129,7 @@
                           <a:effectLst/>
                           <a:latin typeface="Calibri" panose="020F0502020204030204" pitchFamily="34" charset="0"/>
                         </a:rPr>
-                        <a:t>0.803661</a:t>
+                        <a:t>0.804519</a:t>
                       </a:r>
                     </a:p>
                   </a:txBody>
@@ -16350,7 +17186,7 @@
                           <a:effectLst/>
                           <a:latin typeface="Calibri" panose="020F0502020204030204" pitchFamily="34" charset="0"/>
                         </a:rPr>
-                        <a:t>0.569573</a:t>
+                        <a:t>0.57445</a:t>
                       </a:r>
                     </a:p>
                   </a:txBody>
@@ -16400,14 +17236,14 @@
                     <a:p>
                       <a:pPr algn="r" fontAlgn="b"/>
                       <a:r>
-                        <a:rPr lang="en-MY" sz="900" b="0" i="0" u="none" strike="noStrike">
+                        <a:rPr lang="en-MY" sz="900" b="0" i="0" u="none" strike="noStrike" dirty="0">
                           <a:solidFill>
                             <a:srgbClr val="000000"/>
                           </a:solidFill>
                           <a:effectLst/>
                           <a:latin typeface="Calibri" panose="020F0502020204030204" pitchFamily="34" charset="0"/>
                         </a:rPr>
-                        <a:t>0.899027</a:t>
+                        <a:t>0.899478</a:t>
                       </a:r>
                     </a:p>
                   </a:txBody>
@@ -16457,14 +17293,14 @@
                     <a:p>
                       <a:pPr algn="r" fontAlgn="b"/>
                       <a:r>
-                        <a:rPr lang="en-MY" sz="900" b="0" i="0" u="none" strike="noStrike">
+                        <a:rPr lang="en-MY" sz="900" b="0" i="0" u="none" strike="noStrike" dirty="0">
                           <a:solidFill>
                             <a:srgbClr val="000000"/>
                           </a:solidFill>
                           <a:effectLst/>
                           <a:latin typeface="Calibri" panose="020F0502020204030204" pitchFamily="34" charset="0"/>
                         </a:rPr>
-                        <a:t>0.591781</a:t>
+                        <a:t>0.595628</a:t>
                       </a:r>
                     </a:p>
                   </a:txBody>
@@ -16578,7 +17414,7 @@
                           <a:effectLst/>
                           <a:latin typeface="Calibri" panose="020F0502020204030204" pitchFamily="34" charset="0"/>
                         </a:rPr>
-                        <a:t>50</a:t>
+                        <a:t>48</a:t>
                       </a:r>
                     </a:p>
                   </a:txBody>
@@ -16635,7 +17471,7 @@
                           <a:effectLst/>
                           <a:latin typeface="Calibri" panose="020F0502020204030204" pitchFamily="34" charset="0"/>
                         </a:rPr>
-                        <a:t>216</a:t>
+                        <a:t>218</a:t>
                       </a:r>
                     </a:p>
                   </a:txBody>
@@ -16692,7 +17528,7 @@
                           <a:effectLst/>
                           <a:latin typeface="Calibri" panose="020F0502020204030204" pitchFamily="34" charset="0"/>
                         </a:rPr>
-                        <a:t>-1464000</a:t>
+                        <a:t>-1426000</a:t>
                       </a:r>
                     </a:p>
                   </a:txBody>
@@ -16742,14 +17578,14 @@
                     <a:p>
                       <a:pPr algn="r" fontAlgn="b"/>
                       <a:r>
-                        <a:rPr lang="en-MY" sz="900" b="0" i="0" u="none" strike="noStrike" dirty="0">
+                        <a:rPr lang="en-MY" sz="900" b="0" i="0" u="none" strike="noStrike">
                           <a:solidFill>
                             <a:srgbClr val="000000"/>
                           </a:solidFill>
                           <a:effectLst/>
                           <a:latin typeface="Calibri" panose="020F0502020204030204" pitchFamily="34" charset="0"/>
                         </a:rPr>
-                        <a:t>5</a:t>
+                        <a:t>6</a:t>
                       </a:r>
                     </a:p>
                   </a:txBody>
@@ -16794,7 +17630,7 @@
                 </a:tc>
                 <a:extLst>
                   <a:ext uri="{0D108BD9-81ED-4DB2-BD59-A6C34878D82A}">
-                    <a16:rowId xmlns:a16="http://schemas.microsoft.com/office/drawing/2014/main" val="3892829912"/>
+                    <a16:rowId xmlns:a16="http://schemas.microsoft.com/office/drawing/2014/main" val="77639877"/>
                   </a:ext>
                 </a:extLst>
               </a:tr>
@@ -16806,7 +17642,7 @@
                     <a:p>
                       <a:pPr algn="l" fontAlgn="b"/>
                       <a:r>
-                        <a:rPr lang="en-MY" sz="900" b="1" i="0" u="none" strike="noStrike" dirty="0" err="1">
+                        <a:rPr lang="en-MY" sz="900" b="1" i="0" u="none" strike="noStrike" dirty="0">
                           <a:solidFill>
                             <a:srgbClr val="000000"/>
                           </a:solidFill>
@@ -16815,13 +17651,6 @@
                         </a:rPr>
                         <a:t>LightGBMGridSearchPolyNomial</a:t>
                       </a:r>
-                      <a:endParaRPr lang="en-MY" sz="900" b="1" i="0" u="none" strike="noStrike" dirty="0">
-                        <a:solidFill>
-                          <a:srgbClr val="000000"/>
-                        </a:solidFill>
-                        <a:effectLst/>
-                        <a:latin typeface="Calibri" panose="020F0502020204030204" pitchFamily="34" charset="0"/>
-                      </a:endParaRPr>
                     </a:p>
                   </a:txBody>
                   <a:tcPr marL="9525" marR="9525" marT="9525" marB="0" anchor="b">
@@ -16862,7 +17691,7 @@
                       <a:tailEnd type="none" w="med" len="med"/>
                     </a:lnB>
                     <a:solidFill>
-                      <a:schemeClr val="accent4"/>
+                      <a:srgbClr val="FFC000"/>
                     </a:solidFill>
                   </a:tcPr>
                 </a:tc>
@@ -17272,7 +18101,7 @@
                     <a:p>
                       <a:pPr algn="r" fontAlgn="b"/>
                       <a:r>
-                        <a:rPr lang="en-MY" sz="900" b="0" i="0" u="none" strike="noStrike">
+                        <a:rPr lang="en-MY" sz="900" b="0" i="0" u="none" strike="noStrike" dirty="0">
                           <a:solidFill>
                             <a:srgbClr val="000000"/>
                           </a:solidFill>
@@ -17557,14 +18386,14 @@
                     <a:p>
                       <a:pPr algn="r" fontAlgn="b"/>
                       <a:r>
-                        <a:rPr lang="en-MY" sz="900" b="0" i="0" u="none" strike="noStrike" dirty="0">
+                        <a:rPr lang="en-MY" sz="900" b="0" i="0" u="none" strike="noStrike">
                           <a:solidFill>
                             <a:srgbClr val="000000"/>
                           </a:solidFill>
                           <a:effectLst/>
                           <a:latin typeface="Calibri" panose="020F0502020204030204" pitchFamily="34" charset="0"/>
                         </a:rPr>
-                        <a:t>6</a:t>
+                        <a:t>7</a:t>
                       </a:r>
                     </a:p>
                   </a:txBody>
@@ -17609,7 +18438,7 @@
                 </a:tc>
                 <a:extLst>
                   <a:ext uri="{0D108BD9-81ED-4DB2-BD59-A6C34878D82A}">
-                    <a16:rowId xmlns:a16="http://schemas.microsoft.com/office/drawing/2014/main" val="77639877"/>
+                    <a16:rowId xmlns:a16="http://schemas.microsoft.com/office/drawing/2014/main" val="242588125"/>
                   </a:ext>
                 </a:extLst>
               </a:tr>
@@ -17621,7 +18450,7 @@
                     <a:p>
                       <a:pPr algn="l" fontAlgn="b"/>
                       <a:r>
-                        <a:rPr lang="en-MY" sz="900" b="1" i="0" u="none" strike="noStrike" dirty="0" err="1">
+                        <a:rPr lang="en-MY" sz="900" b="1" i="0" u="none" strike="noStrike" dirty="0">
                           <a:solidFill>
                             <a:srgbClr val="000000"/>
                           </a:solidFill>
@@ -17630,13 +18459,6 @@
                         </a:rPr>
                         <a:t>XGBoostGridSearch</a:t>
                       </a:r>
-                      <a:endParaRPr lang="en-MY" sz="900" b="1" i="0" u="none" strike="noStrike" dirty="0">
-                        <a:solidFill>
-                          <a:srgbClr val="000000"/>
-                        </a:solidFill>
-                        <a:effectLst/>
-                        <a:latin typeface="Calibri" panose="020F0502020204030204" pitchFamily="34" charset="0"/>
-                      </a:endParaRPr>
                     </a:p>
                   </a:txBody>
                   <a:tcPr marL="9525" marR="9525" marT="9525" marB="0" anchor="b">
@@ -17677,7 +18499,7 @@
                       <a:tailEnd type="none" w="med" len="med"/>
                     </a:lnB>
                     <a:solidFill>
-                      <a:schemeClr val="accent2">
+                      <a:schemeClr val="accent4">
                         <a:lumMod val="20000"/>
                         <a:lumOff val="80000"/>
                       </a:schemeClr>
@@ -18147,7 +18969,7 @@
                     <a:p>
                       <a:pPr algn="r" fontAlgn="b"/>
                       <a:r>
-                        <a:rPr lang="en-MY" sz="900" b="0" i="0" u="none" strike="noStrike">
+                        <a:rPr lang="en-MY" sz="900" b="0" i="0" u="none" strike="noStrike" dirty="0">
                           <a:solidFill>
                             <a:srgbClr val="000000"/>
                           </a:solidFill>
@@ -18382,7 +19204,7 @@
                           <a:effectLst/>
                           <a:latin typeface="Calibri" panose="020F0502020204030204" pitchFamily="34" charset="0"/>
                         </a:rPr>
-                        <a:t>7</a:t>
+                        <a:t>8</a:t>
                       </a:r>
                     </a:p>
                   </a:txBody>
@@ -18427,7 +19249,7 @@
                 </a:tc>
                 <a:extLst>
                   <a:ext uri="{0D108BD9-81ED-4DB2-BD59-A6C34878D82A}">
-                    <a16:rowId xmlns:a16="http://schemas.microsoft.com/office/drawing/2014/main" val="242588125"/>
+                    <a16:rowId xmlns:a16="http://schemas.microsoft.com/office/drawing/2014/main" val="3640809626"/>
                   </a:ext>
                 </a:extLst>
               </a:tr>
@@ -18439,7 +19261,7 @@
                     <a:p>
                       <a:pPr algn="l" fontAlgn="b"/>
                       <a:r>
-                        <a:rPr lang="en-MY" sz="900" b="1" i="0" u="none" strike="noStrike">
+                        <a:rPr lang="en-MY" sz="900" b="1" i="0" u="none" strike="noStrike" dirty="0" err="1">
                           <a:solidFill>
                             <a:srgbClr val="000000"/>
                           </a:solidFill>
@@ -18448,6 +19270,13 @@
                         </a:rPr>
                         <a:t>DecisionTree</a:t>
                       </a:r>
+                      <a:endParaRPr lang="en-MY" sz="900" b="1" i="0" u="none" strike="noStrike" dirty="0">
+                        <a:solidFill>
+                          <a:srgbClr val="000000"/>
+                        </a:solidFill>
+                        <a:effectLst/>
+                        <a:latin typeface="Calibri" panose="020F0502020204030204" pitchFamily="34" charset="0"/>
+                      </a:endParaRPr>
                     </a:p>
                   </a:txBody>
                   <a:tcPr marL="9525" marR="9525" marT="9525" marB="0" anchor="b">
@@ -19012,7 +19841,7 @@
                     <a:p>
                       <a:pPr algn="r" fontAlgn="b"/>
                       <a:r>
-                        <a:rPr lang="en-MY" sz="900" b="0" i="0" u="none" strike="noStrike">
+                        <a:rPr lang="en-MY" sz="900" b="0" i="0" u="none" strike="noStrike" dirty="0">
                           <a:solidFill>
                             <a:srgbClr val="000000"/>
                           </a:solidFill>
@@ -19183,14 +20012,14 @@
                     <a:p>
                       <a:pPr algn="r" fontAlgn="b"/>
                       <a:r>
-                        <a:rPr lang="en-MY" sz="900" b="0" i="0" u="none" strike="noStrike" dirty="0">
+                        <a:rPr lang="en-MY" sz="900" b="0" i="0" u="none" strike="noStrike">
                           <a:solidFill>
                             <a:srgbClr val="000000"/>
                           </a:solidFill>
                           <a:effectLst/>
                           <a:latin typeface="Calibri" panose="020F0502020204030204" pitchFamily="34" charset="0"/>
                         </a:rPr>
-                        <a:t>8</a:t>
+                        <a:t>9</a:t>
                       </a:r>
                     </a:p>
                   </a:txBody>
@@ -19235,7 +20064,7 @@
                 </a:tc>
                 <a:extLst>
                   <a:ext uri="{0D108BD9-81ED-4DB2-BD59-A6C34878D82A}">
-                    <a16:rowId xmlns:a16="http://schemas.microsoft.com/office/drawing/2014/main" val="3640809626"/>
+                    <a16:rowId xmlns:a16="http://schemas.microsoft.com/office/drawing/2014/main" val="1994176752"/>
                   </a:ext>
                 </a:extLst>
               </a:tr>
@@ -19247,7 +20076,822 @@
                     <a:p>
                       <a:pPr algn="l" fontAlgn="b"/>
                       <a:r>
-                        <a:rPr lang="en-MY" sz="900" b="1" i="0" u="none" strike="noStrike">
+                        <a:rPr lang="en-MY" sz="900" b="1" i="0" u="none" strike="noStrike" dirty="0" err="1">
+                          <a:solidFill>
+                            <a:srgbClr val="000000"/>
+                          </a:solidFill>
+                          <a:effectLst/>
+                          <a:latin typeface="Calibri" panose="020F0502020204030204" pitchFamily="34" charset="0"/>
+                        </a:rPr>
+                        <a:t>SupportVectorMachine</a:t>
+                      </a:r>
+                      <a:endParaRPr lang="en-MY" sz="900" b="1" i="0" u="none" strike="noStrike" dirty="0">
+                        <a:solidFill>
+                          <a:srgbClr val="000000"/>
+                        </a:solidFill>
+                        <a:effectLst/>
+                        <a:latin typeface="Calibri" panose="020F0502020204030204" pitchFamily="34" charset="0"/>
+                      </a:endParaRPr>
+                    </a:p>
+                  </a:txBody>
+                  <a:tcPr marL="9525" marR="9525" marT="9525" marB="0" anchor="b">
+                    <a:lnL w="12700" cap="flat" cmpd="sng" algn="ctr">
+                      <a:solidFill>
+                        <a:schemeClr val="tx1"/>
+                      </a:solidFill>
+                      <a:prstDash val="solid"/>
+                      <a:round/>
+                      <a:headEnd type="none" w="med" len="med"/>
+                      <a:tailEnd type="none" w="med" len="med"/>
+                    </a:lnL>
+                    <a:lnR w="12700" cap="flat" cmpd="sng" algn="ctr">
+                      <a:solidFill>
+                        <a:schemeClr val="tx1"/>
+                      </a:solidFill>
+                      <a:prstDash val="solid"/>
+                      <a:round/>
+                      <a:headEnd type="none" w="med" len="med"/>
+                      <a:tailEnd type="none" w="med" len="med"/>
+                    </a:lnR>
+                    <a:lnT w="12700" cap="flat" cmpd="sng" algn="ctr">
+                      <a:solidFill>
+                        <a:schemeClr val="tx1"/>
+                      </a:solidFill>
+                      <a:prstDash val="solid"/>
+                      <a:round/>
+                      <a:headEnd type="none" w="med" len="med"/>
+                      <a:tailEnd type="none" w="med" len="med"/>
+                    </a:lnT>
+                    <a:lnB w="12700" cap="flat" cmpd="sng" algn="ctr">
+                      <a:solidFill>
+                        <a:schemeClr val="tx1"/>
+                      </a:solidFill>
+                      <a:prstDash val="solid"/>
+                      <a:round/>
+                      <a:headEnd type="none" w="med" len="med"/>
+                      <a:tailEnd type="none" w="med" len="med"/>
+                    </a:lnB>
+                    <a:solidFill>
+                      <a:schemeClr val="accent4"/>
+                    </a:solidFill>
+                  </a:tcPr>
+                </a:tc>
+                <a:tc>
+                  <a:txBody>
+                    <a:bodyPr/>
+                    <a:lstStyle/>
+                    <a:p>
+                      <a:pPr algn="r" fontAlgn="b"/>
+                      <a:r>
+                        <a:rPr lang="en-MY" sz="900" b="0" i="0" u="none" strike="noStrike">
+                          <a:solidFill>
+                            <a:srgbClr val="000000"/>
+                          </a:solidFill>
+                          <a:effectLst/>
+                          <a:latin typeface="Calibri" panose="020F0502020204030204" pitchFamily="34" charset="0"/>
+                        </a:rPr>
+                        <a:t>0.986141</a:t>
+                      </a:r>
+                    </a:p>
+                  </a:txBody>
+                  <a:tcPr marL="9525" marR="9525" marT="9525" marB="0" anchor="b">
+                    <a:lnL w="12700" cap="flat" cmpd="sng" algn="ctr">
+                      <a:solidFill>
+                        <a:schemeClr val="tx1"/>
+                      </a:solidFill>
+                      <a:prstDash val="solid"/>
+                      <a:round/>
+                      <a:headEnd type="none" w="med" len="med"/>
+                      <a:tailEnd type="none" w="med" len="med"/>
+                    </a:lnL>
+                    <a:lnR w="12700" cap="flat" cmpd="sng" algn="ctr">
+                      <a:solidFill>
+                        <a:schemeClr val="tx1"/>
+                      </a:solidFill>
+                      <a:prstDash val="solid"/>
+                      <a:round/>
+                      <a:headEnd type="none" w="med" len="med"/>
+                      <a:tailEnd type="none" w="med" len="med"/>
+                    </a:lnR>
+                    <a:lnT w="12700" cap="flat" cmpd="sng" algn="ctr">
+                      <a:solidFill>
+                        <a:schemeClr val="tx1"/>
+                      </a:solidFill>
+                      <a:prstDash val="solid"/>
+                      <a:round/>
+                      <a:headEnd type="none" w="med" len="med"/>
+                      <a:tailEnd type="none" w="med" len="med"/>
+                    </a:lnT>
+                    <a:lnB w="12700" cap="flat" cmpd="sng" algn="ctr">
+                      <a:solidFill>
+                        <a:schemeClr val="tx1"/>
+                      </a:solidFill>
+                      <a:prstDash val="solid"/>
+                      <a:round/>
+                      <a:headEnd type="none" w="med" len="med"/>
+                      <a:tailEnd type="none" w="med" len="med"/>
+                    </a:lnB>
+                  </a:tcPr>
+                </a:tc>
+                <a:tc>
+                  <a:txBody>
+                    <a:bodyPr/>
+                    <a:lstStyle/>
+                    <a:p>
+                      <a:pPr algn="r" fontAlgn="b"/>
+                      <a:r>
+                        <a:rPr lang="en-MY" sz="900" b="0" i="0" u="none" strike="noStrike">
+                          <a:solidFill>
+                            <a:srgbClr val="000000"/>
+                          </a:solidFill>
+                          <a:effectLst/>
+                          <a:latin typeface="Calibri" panose="020F0502020204030204" pitchFamily="34" charset="0"/>
+                        </a:rPr>
+                        <a:t>0.733436</a:t>
+                      </a:r>
+                    </a:p>
+                  </a:txBody>
+                  <a:tcPr marL="9525" marR="9525" marT="9525" marB="0" anchor="b">
+                    <a:lnL w="12700" cap="flat" cmpd="sng" algn="ctr">
+                      <a:solidFill>
+                        <a:schemeClr val="tx1"/>
+                      </a:solidFill>
+                      <a:prstDash val="solid"/>
+                      <a:round/>
+                      <a:headEnd type="none" w="med" len="med"/>
+                      <a:tailEnd type="none" w="med" len="med"/>
+                    </a:lnL>
+                    <a:lnR w="12700" cap="flat" cmpd="sng" algn="ctr">
+                      <a:solidFill>
+                        <a:schemeClr val="tx1"/>
+                      </a:solidFill>
+                      <a:prstDash val="solid"/>
+                      <a:round/>
+                      <a:headEnd type="none" w="med" len="med"/>
+                      <a:tailEnd type="none" w="med" len="med"/>
+                    </a:lnR>
+                    <a:lnT w="12700" cap="flat" cmpd="sng" algn="ctr">
+                      <a:solidFill>
+                        <a:schemeClr val="tx1"/>
+                      </a:solidFill>
+                      <a:prstDash val="solid"/>
+                      <a:round/>
+                      <a:headEnd type="none" w="med" len="med"/>
+                      <a:tailEnd type="none" w="med" len="med"/>
+                    </a:lnT>
+                    <a:lnB w="12700" cap="flat" cmpd="sng" algn="ctr">
+                      <a:solidFill>
+                        <a:schemeClr val="tx1"/>
+                      </a:solidFill>
+                      <a:prstDash val="solid"/>
+                      <a:round/>
+                      <a:headEnd type="none" w="med" len="med"/>
+                      <a:tailEnd type="none" w="med" len="med"/>
+                    </a:lnB>
+                  </a:tcPr>
+                </a:tc>
+                <a:tc>
+                  <a:txBody>
+                    <a:bodyPr/>
+                    <a:lstStyle/>
+                    <a:p>
+                      <a:pPr algn="r" fontAlgn="b"/>
+                      <a:r>
+                        <a:rPr lang="en-MY" sz="900" b="0" i="0" u="none" strike="noStrike">
+                          <a:solidFill>
+                            <a:srgbClr val="000000"/>
+                          </a:solidFill>
+                          <a:effectLst/>
+                          <a:latin typeface="Calibri" panose="020F0502020204030204" pitchFamily="34" charset="0"/>
+                        </a:rPr>
+                        <a:t>0.986141</a:t>
+                      </a:r>
+                    </a:p>
+                  </a:txBody>
+                  <a:tcPr marL="9525" marR="9525" marT="9525" marB="0" anchor="b">
+                    <a:lnL w="12700" cap="flat" cmpd="sng" algn="ctr">
+                      <a:solidFill>
+                        <a:schemeClr val="tx1"/>
+                      </a:solidFill>
+                      <a:prstDash val="solid"/>
+                      <a:round/>
+                      <a:headEnd type="none" w="med" len="med"/>
+                      <a:tailEnd type="none" w="med" len="med"/>
+                    </a:lnL>
+                    <a:lnR w="12700" cap="flat" cmpd="sng" algn="ctr">
+                      <a:solidFill>
+                        <a:schemeClr val="tx1"/>
+                      </a:solidFill>
+                      <a:prstDash val="solid"/>
+                      <a:round/>
+                      <a:headEnd type="none" w="med" len="med"/>
+                      <a:tailEnd type="none" w="med" len="med"/>
+                    </a:lnR>
+                    <a:lnT w="12700" cap="flat" cmpd="sng" algn="ctr">
+                      <a:solidFill>
+                        <a:schemeClr val="tx1"/>
+                      </a:solidFill>
+                      <a:prstDash val="solid"/>
+                      <a:round/>
+                      <a:headEnd type="none" w="med" len="med"/>
+                      <a:tailEnd type="none" w="med" len="med"/>
+                    </a:lnT>
+                    <a:lnB w="12700" cap="flat" cmpd="sng" algn="ctr">
+                      <a:solidFill>
+                        <a:schemeClr val="tx1"/>
+                      </a:solidFill>
+                      <a:prstDash val="solid"/>
+                      <a:round/>
+                      <a:headEnd type="none" w="med" len="med"/>
+                      <a:tailEnd type="none" w="med" len="med"/>
+                    </a:lnB>
+                  </a:tcPr>
+                </a:tc>
+                <a:tc>
+                  <a:txBody>
+                    <a:bodyPr/>
+                    <a:lstStyle/>
+                    <a:p>
+                      <a:pPr algn="r" fontAlgn="b"/>
+                      <a:r>
+                        <a:rPr lang="en-MY" sz="900" b="0" i="0" u="none" strike="noStrike">
+                          <a:solidFill>
+                            <a:srgbClr val="000000"/>
+                          </a:solidFill>
+                          <a:effectLst/>
+                          <a:latin typeface="Calibri" panose="020F0502020204030204" pitchFamily="34" charset="0"/>
+                        </a:rPr>
+                        <a:t>0.789959</a:t>
+                      </a:r>
+                    </a:p>
+                  </a:txBody>
+                  <a:tcPr marL="9525" marR="9525" marT="9525" marB="0" anchor="b">
+                    <a:lnL w="12700" cap="flat" cmpd="sng" algn="ctr">
+                      <a:solidFill>
+                        <a:schemeClr val="tx1"/>
+                      </a:solidFill>
+                      <a:prstDash val="solid"/>
+                      <a:round/>
+                      <a:headEnd type="none" w="med" len="med"/>
+                      <a:tailEnd type="none" w="med" len="med"/>
+                    </a:lnL>
+                    <a:lnR w="12700" cap="flat" cmpd="sng" algn="ctr">
+                      <a:solidFill>
+                        <a:schemeClr val="tx1"/>
+                      </a:solidFill>
+                      <a:prstDash val="solid"/>
+                      <a:round/>
+                      <a:headEnd type="none" w="med" len="med"/>
+                      <a:tailEnd type="none" w="med" len="med"/>
+                    </a:lnR>
+                    <a:lnT w="12700" cap="flat" cmpd="sng" algn="ctr">
+                      <a:solidFill>
+                        <a:schemeClr val="tx1"/>
+                      </a:solidFill>
+                      <a:prstDash val="solid"/>
+                      <a:round/>
+                      <a:headEnd type="none" w="med" len="med"/>
+                      <a:tailEnd type="none" w="med" len="med"/>
+                    </a:lnT>
+                    <a:lnB w="12700" cap="flat" cmpd="sng" algn="ctr">
+                      <a:solidFill>
+                        <a:schemeClr val="tx1"/>
+                      </a:solidFill>
+                      <a:prstDash val="solid"/>
+                      <a:round/>
+                      <a:headEnd type="none" w="med" len="med"/>
+                      <a:tailEnd type="none" w="med" len="med"/>
+                    </a:lnB>
+                  </a:tcPr>
+                </a:tc>
+                <a:tc>
+                  <a:txBody>
+                    <a:bodyPr/>
+                    <a:lstStyle/>
+                    <a:p>
+                      <a:pPr algn="r" fontAlgn="b"/>
+                      <a:r>
+                        <a:rPr lang="en-MY" sz="900" b="0" i="0" u="none" strike="noStrike">
+                          <a:solidFill>
+                            <a:srgbClr val="000000"/>
+                          </a:solidFill>
+                          <a:effectLst/>
+                          <a:latin typeface="Calibri" panose="020F0502020204030204" pitchFamily="34" charset="0"/>
+                        </a:rPr>
+                        <a:t>0.97229</a:t>
+                      </a:r>
+                    </a:p>
+                  </a:txBody>
+                  <a:tcPr marL="9525" marR="9525" marT="9525" marB="0" anchor="b">
+                    <a:lnL w="12700" cap="flat" cmpd="sng" algn="ctr">
+                      <a:solidFill>
+                        <a:schemeClr val="tx1"/>
+                      </a:solidFill>
+                      <a:prstDash val="solid"/>
+                      <a:round/>
+                      <a:headEnd type="none" w="med" len="med"/>
+                      <a:tailEnd type="none" w="med" len="med"/>
+                    </a:lnL>
+                    <a:lnR w="12700" cap="flat" cmpd="sng" algn="ctr">
+                      <a:solidFill>
+                        <a:schemeClr val="tx1"/>
+                      </a:solidFill>
+                      <a:prstDash val="solid"/>
+                      <a:round/>
+                      <a:headEnd type="none" w="med" len="med"/>
+                      <a:tailEnd type="none" w="med" len="med"/>
+                    </a:lnR>
+                    <a:lnT w="12700" cap="flat" cmpd="sng" algn="ctr">
+                      <a:solidFill>
+                        <a:schemeClr val="tx1"/>
+                      </a:solidFill>
+                      <a:prstDash val="solid"/>
+                      <a:round/>
+                      <a:headEnd type="none" w="med" len="med"/>
+                      <a:tailEnd type="none" w="med" len="med"/>
+                    </a:lnT>
+                    <a:lnB w="12700" cap="flat" cmpd="sng" algn="ctr">
+                      <a:solidFill>
+                        <a:schemeClr val="tx1"/>
+                      </a:solidFill>
+                      <a:prstDash val="solid"/>
+                      <a:round/>
+                      <a:headEnd type="none" w="med" len="med"/>
+                      <a:tailEnd type="none" w="med" len="med"/>
+                    </a:lnB>
+                  </a:tcPr>
+                </a:tc>
+                <a:tc>
+                  <a:txBody>
+                    <a:bodyPr/>
+                    <a:lstStyle/>
+                    <a:p>
+                      <a:pPr algn="r" fontAlgn="b"/>
+                      <a:r>
+                        <a:rPr lang="en-MY" sz="900" b="0" i="0" u="none" strike="noStrike">
+                          <a:solidFill>
+                            <a:srgbClr val="000000"/>
+                          </a:solidFill>
+                          <a:effectLst/>
+                          <a:latin typeface="Calibri" panose="020F0502020204030204" pitchFamily="34" charset="0"/>
+                        </a:rPr>
+                        <a:t>0.304961</a:t>
+                      </a:r>
+                    </a:p>
+                  </a:txBody>
+                  <a:tcPr marL="9525" marR="9525" marT="9525" marB="0" anchor="b">
+                    <a:lnL w="12700" cap="flat" cmpd="sng" algn="ctr">
+                      <a:solidFill>
+                        <a:schemeClr val="tx1"/>
+                      </a:solidFill>
+                      <a:prstDash val="solid"/>
+                      <a:round/>
+                      <a:headEnd type="none" w="med" len="med"/>
+                      <a:tailEnd type="none" w="med" len="med"/>
+                    </a:lnL>
+                    <a:lnR w="12700" cap="flat" cmpd="sng" algn="ctr">
+                      <a:solidFill>
+                        <a:schemeClr val="tx1"/>
+                      </a:solidFill>
+                      <a:prstDash val="solid"/>
+                      <a:round/>
+                      <a:headEnd type="none" w="med" len="med"/>
+                      <a:tailEnd type="none" w="med" len="med"/>
+                    </a:lnR>
+                    <a:lnT w="12700" cap="flat" cmpd="sng" algn="ctr">
+                      <a:solidFill>
+                        <a:schemeClr val="tx1"/>
+                      </a:solidFill>
+                      <a:prstDash val="solid"/>
+                      <a:round/>
+                      <a:headEnd type="none" w="med" len="med"/>
+                      <a:tailEnd type="none" w="med" len="med"/>
+                    </a:lnT>
+                    <a:lnB w="12700" cap="flat" cmpd="sng" algn="ctr">
+                      <a:solidFill>
+                        <a:schemeClr val="tx1"/>
+                      </a:solidFill>
+                      <a:prstDash val="solid"/>
+                      <a:round/>
+                      <a:headEnd type="none" w="med" len="med"/>
+                      <a:tailEnd type="none" w="med" len="med"/>
+                    </a:lnB>
+                  </a:tcPr>
+                </a:tc>
+                <a:tc>
+                  <a:txBody>
+                    <a:bodyPr/>
+                    <a:lstStyle/>
+                    <a:p>
+                      <a:pPr algn="r" fontAlgn="b"/>
+                      <a:r>
+                        <a:rPr lang="en-MY" sz="900" b="0" i="0" u="none" strike="noStrike">
+                          <a:solidFill>
+                            <a:srgbClr val="000000"/>
+                          </a:solidFill>
+                          <a:effectLst/>
+                          <a:latin typeface="Calibri" panose="020F0502020204030204" pitchFamily="34" charset="0"/>
+                        </a:rPr>
+                        <a:t>0.986168</a:t>
+                      </a:r>
+                    </a:p>
+                  </a:txBody>
+                  <a:tcPr marL="9525" marR="9525" marT="9525" marB="0" anchor="b">
+                    <a:lnL w="12700" cap="flat" cmpd="sng" algn="ctr">
+                      <a:solidFill>
+                        <a:schemeClr val="tx1"/>
+                      </a:solidFill>
+                      <a:prstDash val="solid"/>
+                      <a:round/>
+                      <a:headEnd type="none" w="med" len="med"/>
+                      <a:tailEnd type="none" w="med" len="med"/>
+                    </a:lnL>
+                    <a:lnR w="12700" cap="flat" cmpd="sng" algn="ctr">
+                      <a:solidFill>
+                        <a:schemeClr val="tx1"/>
+                      </a:solidFill>
+                      <a:prstDash val="solid"/>
+                      <a:round/>
+                      <a:headEnd type="none" w="med" len="med"/>
+                      <a:tailEnd type="none" w="med" len="med"/>
+                    </a:lnR>
+                    <a:lnT w="12700" cap="flat" cmpd="sng" algn="ctr">
+                      <a:solidFill>
+                        <a:schemeClr val="tx1"/>
+                      </a:solidFill>
+                      <a:prstDash val="solid"/>
+                      <a:round/>
+                      <a:headEnd type="none" w="med" len="med"/>
+                      <a:tailEnd type="none" w="med" len="med"/>
+                    </a:lnT>
+                    <a:lnB w="12700" cap="flat" cmpd="sng" algn="ctr">
+                      <a:solidFill>
+                        <a:schemeClr val="tx1"/>
+                      </a:solidFill>
+                      <a:prstDash val="solid"/>
+                      <a:round/>
+                      <a:headEnd type="none" w="med" len="med"/>
+                      <a:tailEnd type="none" w="med" len="med"/>
+                    </a:lnB>
+                  </a:tcPr>
+                </a:tc>
+                <a:tc>
+                  <a:txBody>
+                    <a:bodyPr/>
+                    <a:lstStyle/>
+                    <a:p>
+                      <a:pPr algn="r" fontAlgn="b"/>
+                      <a:r>
+                        <a:rPr lang="en-MY" sz="900" b="0" i="0" u="none" strike="noStrike">
+                          <a:solidFill>
+                            <a:srgbClr val="000000"/>
+                          </a:solidFill>
+                          <a:effectLst/>
+                          <a:latin typeface="Calibri" panose="020F0502020204030204" pitchFamily="34" charset="0"/>
+                        </a:rPr>
+                        <a:t>0.348768</a:t>
+                      </a:r>
+                    </a:p>
+                  </a:txBody>
+                  <a:tcPr marL="9525" marR="9525" marT="9525" marB="0" anchor="b">
+                    <a:lnL w="12700" cap="flat" cmpd="sng" algn="ctr">
+                      <a:solidFill>
+                        <a:schemeClr val="tx1"/>
+                      </a:solidFill>
+                      <a:prstDash val="solid"/>
+                      <a:round/>
+                      <a:headEnd type="none" w="med" len="med"/>
+                      <a:tailEnd type="none" w="med" len="med"/>
+                    </a:lnL>
+                    <a:lnR w="12700" cap="flat" cmpd="sng" algn="ctr">
+                      <a:solidFill>
+                        <a:schemeClr val="tx1"/>
+                      </a:solidFill>
+                      <a:prstDash val="solid"/>
+                      <a:round/>
+                      <a:headEnd type="none" w="med" len="med"/>
+                      <a:tailEnd type="none" w="med" len="med"/>
+                    </a:lnR>
+                    <a:lnT w="12700" cap="flat" cmpd="sng" algn="ctr">
+                      <a:solidFill>
+                        <a:schemeClr val="tx1"/>
+                      </a:solidFill>
+                      <a:prstDash val="solid"/>
+                      <a:round/>
+                      <a:headEnd type="none" w="med" len="med"/>
+                      <a:tailEnd type="none" w="med" len="med"/>
+                    </a:lnT>
+                    <a:lnB w="12700" cap="flat" cmpd="sng" algn="ctr">
+                      <a:solidFill>
+                        <a:schemeClr val="tx1"/>
+                      </a:solidFill>
+                      <a:prstDash val="solid"/>
+                      <a:round/>
+                      <a:headEnd type="none" w="med" len="med"/>
+                      <a:tailEnd type="none" w="med" len="med"/>
+                    </a:lnB>
+                  </a:tcPr>
+                </a:tc>
+                <a:tc>
+                  <a:txBody>
+                    <a:bodyPr/>
+                    <a:lstStyle/>
+                    <a:p>
+                      <a:pPr algn="r" fontAlgn="b"/>
+                      <a:r>
+                        <a:rPr lang="en-MY" sz="900" b="0" i="0" u="none" strike="noStrike">
+                          <a:solidFill>
+                            <a:srgbClr val="000000"/>
+                          </a:solidFill>
+                          <a:effectLst/>
+                          <a:latin typeface="Calibri" panose="020F0502020204030204" pitchFamily="34" charset="0"/>
+                        </a:rPr>
+                        <a:t>572</a:t>
+                      </a:r>
+                    </a:p>
+                  </a:txBody>
+                  <a:tcPr marL="9525" marR="9525" marT="9525" marB="0" anchor="b">
+                    <a:lnL w="12700" cap="flat" cmpd="sng" algn="ctr">
+                      <a:solidFill>
+                        <a:schemeClr val="tx1"/>
+                      </a:solidFill>
+                      <a:prstDash val="solid"/>
+                      <a:round/>
+                      <a:headEnd type="none" w="med" len="med"/>
+                      <a:tailEnd type="none" w="med" len="med"/>
+                    </a:lnL>
+                    <a:lnR w="12700" cap="flat" cmpd="sng" algn="ctr">
+                      <a:solidFill>
+                        <a:schemeClr val="tx1"/>
+                      </a:solidFill>
+                      <a:prstDash val="solid"/>
+                      <a:round/>
+                      <a:headEnd type="none" w="med" len="med"/>
+                      <a:tailEnd type="none" w="med" len="med"/>
+                    </a:lnR>
+                    <a:lnT w="12700" cap="flat" cmpd="sng" algn="ctr">
+                      <a:solidFill>
+                        <a:schemeClr val="tx1"/>
+                      </a:solidFill>
+                      <a:prstDash val="solid"/>
+                      <a:round/>
+                      <a:headEnd type="none" w="med" len="med"/>
+                      <a:tailEnd type="none" w="med" len="med"/>
+                    </a:lnT>
+                    <a:lnB w="12700" cap="flat" cmpd="sng" algn="ctr">
+                      <a:solidFill>
+                        <a:schemeClr val="tx1"/>
+                      </a:solidFill>
+                      <a:prstDash val="solid"/>
+                      <a:round/>
+                      <a:headEnd type="none" w="med" len="med"/>
+                      <a:tailEnd type="none" w="med" len="med"/>
+                    </a:lnB>
+                  </a:tcPr>
+                </a:tc>
+                <a:tc>
+                  <a:txBody>
+                    <a:bodyPr/>
+                    <a:lstStyle/>
+                    <a:p>
+                      <a:pPr algn="r" fontAlgn="b"/>
+                      <a:r>
+                        <a:rPr lang="en-MY" sz="900" b="0" i="0" u="none" strike="noStrike" dirty="0">
+                          <a:solidFill>
+                            <a:srgbClr val="000000"/>
+                          </a:solidFill>
+                          <a:effectLst/>
+                          <a:latin typeface="Calibri" panose="020F0502020204030204" pitchFamily="34" charset="0"/>
+                        </a:rPr>
+                        <a:t>89</a:t>
+                      </a:r>
+                    </a:p>
+                  </a:txBody>
+                  <a:tcPr marL="9525" marR="9525" marT="9525" marB="0" anchor="b">
+                    <a:lnL w="12700" cap="flat" cmpd="sng" algn="ctr">
+                      <a:solidFill>
+                        <a:schemeClr val="tx1"/>
+                      </a:solidFill>
+                      <a:prstDash val="solid"/>
+                      <a:round/>
+                      <a:headEnd type="none" w="med" len="med"/>
+                      <a:tailEnd type="none" w="med" len="med"/>
+                    </a:lnL>
+                    <a:lnR w="12700" cap="flat" cmpd="sng" algn="ctr">
+                      <a:solidFill>
+                        <a:schemeClr val="tx1"/>
+                      </a:solidFill>
+                      <a:prstDash val="solid"/>
+                      <a:round/>
+                      <a:headEnd type="none" w="med" len="med"/>
+                      <a:tailEnd type="none" w="med" len="med"/>
+                    </a:lnR>
+                    <a:lnT w="12700" cap="flat" cmpd="sng" algn="ctr">
+                      <a:solidFill>
+                        <a:schemeClr val="tx1"/>
+                      </a:solidFill>
+                      <a:prstDash val="solid"/>
+                      <a:round/>
+                      <a:headEnd type="none" w="med" len="med"/>
+                      <a:tailEnd type="none" w="med" len="med"/>
+                    </a:lnT>
+                    <a:lnB w="12700" cap="flat" cmpd="sng" algn="ctr">
+                      <a:solidFill>
+                        <a:schemeClr val="tx1"/>
+                      </a:solidFill>
+                      <a:prstDash val="solid"/>
+                      <a:round/>
+                      <a:headEnd type="none" w="med" len="med"/>
+                      <a:tailEnd type="none" w="med" len="med"/>
+                    </a:lnB>
+                  </a:tcPr>
+                </a:tc>
+                <a:tc>
+                  <a:txBody>
+                    <a:bodyPr/>
+                    <a:lstStyle/>
+                    <a:p>
+                      <a:pPr algn="r" fontAlgn="b"/>
+                      <a:r>
+                        <a:rPr lang="en-MY" sz="900" b="0" i="0" u="none" strike="noStrike" dirty="0">
+                          <a:solidFill>
+                            <a:srgbClr val="000000"/>
+                          </a:solidFill>
+                          <a:effectLst/>
+                          <a:latin typeface="Calibri" panose="020F0502020204030204" pitchFamily="34" charset="0"/>
+                        </a:rPr>
+                        <a:t>177</a:t>
+                      </a:r>
+                    </a:p>
+                  </a:txBody>
+                  <a:tcPr marL="9525" marR="9525" marT="9525" marB="0" anchor="b">
+                    <a:lnL w="12700" cap="flat" cmpd="sng" algn="ctr">
+                      <a:solidFill>
+                        <a:schemeClr val="tx1"/>
+                      </a:solidFill>
+                      <a:prstDash val="solid"/>
+                      <a:round/>
+                      <a:headEnd type="none" w="med" len="med"/>
+                      <a:tailEnd type="none" w="med" len="med"/>
+                    </a:lnL>
+                    <a:lnR w="12700" cap="flat" cmpd="sng" algn="ctr">
+                      <a:solidFill>
+                        <a:schemeClr val="tx1"/>
+                      </a:solidFill>
+                      <a:prstDash val="solid"/>
+                      <a:round/>
+                      <a:headEnd type="none" w="med" len="med"/>
+                      <a:tailEnd type="none" w="med" len="med"/>
+                    </a:lnR>
+                    <a:lnT w="12700" cap="flat" cmpd="sng" algn="ctr">
+                      <a:solidFill>
+                        <a:schemeClr val="tx1"/>
+                      </a:solidFill>
+                      <a:prstDash val="solid"/>
+                      <a:round/>
+                      <a:headEnd type="none" w="med" len="med"/>
+                      <a:tailEnd type="none" w="med" len="med"/>
+                    </a:lnT>
+                    <a:lnB w="12700" cap="flat" cmpd="sng" algn="ctr">
+                      <a:solidFill>
+                        <a:schemeClr val="tx1"/>
+                      </a:solidFill>
+                      <a:prstDash val="solid"/>
+                      <a:round/>
+                      <a:headEnd type="none" w="med" len="med"/>
+                      <a:tailEnd type="none" w="med" len="med"/>
+                    </a:lnB>
+                  </a:tcPr>
+                </a:tc>
+                <a:tc>
+                  <a:txBody>
+                    <a:bodyPr/>
+                    <a:lstStyle/>
+                    <a:p>
+                      <a:pPr algn="r" fontAlgn="b"/>
+                      <a:r>
+                        <a:rPr lang="en-MY" sz="900" b="0" i="0" u="none" strike="noStrike">
+                          <a:solidFill>
+                            <a:srgbClr val="000000"/>
+                          </a:solidFill>
+                          <a:effectLst/>
+                          <a:latin typeface="Calibri" panose="020F0502020204030204" pitchFamily="34" charset="0"/>
+                        </a:rPr>
+                        <a:t>-2529000</a:t>
+                      </a:r>
+                    </a:p>
+                  </a:txBody>
+                  <a:tcPr marL="9525" marR="9525" marT="9525" marB="0" anchor="b">
+                    <a:lnL w="12700" cap="flat" cmpd="sng" algn="ctr">
+                      <a:solidFill>
+                        <a:schemeClr val="tx1"/>
+                      </a:solidFill>
+                      <a:prstDash val="solid"/>
+                      <a:round/>
+                      <a:headEnd type="none" w="med" len="med"/>
+                      <a:tailEnd type="none" w="med" len="med"/>
+                    </a:lnL>
+                    <a:lnR w="12700" cap="flat" cmpd="sng" algn="ctr">
+                      <a:solidFill>
+                        <a:schemeClr val="tx1"/>
+                      </a:solidFill>
+                      <a:prstDash val="solid"/>
+                      <a:round/>
+                      <a:headEnd type="none" w="med" len="med"/>
+                      <a:tailEnd type="none" w="med" len="med"/>
+                    </a:lnR>
+                    <a:lnT w="12700" cap="flat" cmpd="sng" algn="ctr">
+                      <a:solidFill>
+                        <a:schemeClr val="tx1"/>
+                      </a:solidFill>
+                      <a:prstDash val="solid"/>
+                      <a:round/>
+                      <a:headEnd type="none" w="med" len="med"/>
+                      <a:tailEnd type="none" w="med" len="med"/>
+                    </a:lnT>
+                    <a:lnB w="12700" cap="flat" cmpd="sng" algn="ctr">
+                      <a:solidFill>
+                        <a:schemeClr val="tx1"/>
+                      </a:solidFill>
+                      <a:prstDash val="solid"/>
+                      <a:round/>
+                      <a:headEnd type="none" w="med" len="med"/>
+                      <a:tailEnd type="none" w="med" len="med"/>
+                    </a:lnB>
+                  </a:tcPr>
+                </a:tc>
+                <a:tc>
+                  <a:txBody>
+                    <a:bodyPr/>
+                    <a:lstStyle/>
+                    <a:p>
+                      <a:pPr algn="r" fontAlgn="b"/>
+                      <a:r>
+                        <a:rPr lang="en-MY" sz="900" b="0" i="0" u="none" strike="noStrike">
+                          <a:solidFill>
+                            <a:srgbClr val="000000"/>
+                          </a:solidFill>
+                          <a:effectLst/>
+                          <a:latin typeface="Calibri" panose="020F0502020204030204" pitchFamily="34" charset="0"/>
+                        </a:rPr>
+                        <a:t>10</a:t>
+                      </a:r>
+                    </a:p>
+                  </a:txBody>
+                  <a:tcPr marL="9525" marR="9525" marT="9525" marB="0" anchor="b">
+                    <a:lnL w="12700" cap="flat" cmpd="sng" algn="ctr">
+                      <a:solidFill>
+                        <a:schemeClr val="tx1"/>
+                      </a:solidFill>
+                      <a:prstDash val="solid"/>
+                      <a:round/>
+                      <a:headEnd type="none" w="med" len="med"/>
+                      <a:tailEnd type="none" w="med" len="med"/>
+                    </a:lnL>
+                    <a:lnR w="12700" cap="flat" cmpd="sng" algn="ctr">
+                      <a:solidFill>
+                        <a:schemeClr val="tx1"/>
+                      </a:solidFill>
+                      <a:prstDash val="solid"/>
+                      <a:round/>
+                      <a:headEnd type="none" w="med" len="med"/>
+                      <a:tailEnd type="none" w="med" len="med"/>
+                    </a:lnR>
+                    <a:lnT w="12700" cap="flat" cmpd="sng" algn="ctr">
+                      <a:solidFill>
+                        <a:schemeClr val="tx1"/>
+                      </a:solidFill>
+                      <a:prstDash val="solid"/>
+                      <a:round/>
+                      <a:headEnd type="none" w="med" len="med"/>
+                      <a:tailEnd type="none" w="med" len="med"/>
+                    </a:lnT>
+                    <a:lnB w="12700" cap="flat" cmpd="sng" algn="ctr">
+                      <a:solidFill>
+                        <a:schemeClr val="tx1"/>
+                      </a:solidFill>
+                      <a:prstDash val="solid"/>
+                      <a:round/>
+                      <a:headEnd type="none" w="med" len="med"/>
+                      <a:tailEnd type="none" w="med" len="med"/>
+                    </a:lnB>
+                  </a:tcPr>
+                </a:tc>
+                <a:extLst>
+                  <a:ext uri="{0D108BD9-81ED-4DB2-BD59-A6C34878D82A}">
+                    <a16:rowId xmlns:a16="http://schemas.microsoft.com/office/drawing/2014/main" val="2197108998"/>
+                  </a:ext>
+                </a:extLst>
+              </a:tr>
+              <a:tr h="211539">
+                <a:tc>
+                  <a:txBody>
+                    <a:bodyPr/>
+                    <a:lstStyle/>
+                    <a:p>
+                      <a:pPr algn="l" fontAlgn="b"/>
+                      <a:r>
+                        <a:rPr lang="en-MY" sz="900" b="1" i="0" u="none" strike="noStrike" dirty="0" err="1">
                           <a:solidFill>
                             <a:srgbClr val="000000"/>
                           </a:solidFill>
@@ -19256,6 +20900,13 @@
                         </a:rPr>
                         <a:t>TensorflowMLP</a:t>
                       </a:r>
+                      <a:endParaRPr lang="en-MY" sz="900" b="1" i="0" u="none" strike="noStrike" dirty="0">
+                        <a:solidFill>
+                          <a:srgbClr val="000000"/>
+                        </a:solidFill>
+                        <a:effectLst/>
+                        <a:latin typeface="Calibri" panose="020F0502020204030204" pitchFamily="34" charset="0"/>
+                      </a:endParaRPr>
                     </a:p>
                   </a:txBody>
                   <a:tcPr marL="9525" marR="9525" marT="9525" marB="0" anchor="b">
@@ -19877,7 +21528,7 @@
                     <a:p>
                       <a:pPr algn="r" fontAlgn="b"/>
                       <a:r>
-                        <a:rPr lang="en-MY" sz="900" b="0" i="0" u="none" strike="noStrike">
+                        <a:rPr lang="en-MY" sz="900" b="0" i="0" u="none" strike="noStrike" dirty="0">
                           <a:solidFill>
                             <a:srgbClr val="000000"/>
                           </a:solidFill>
@@ -19885,6 +21536,63 @@
                           <a:latin typeface="Calibri" panose="020F0502020204030204" pitchFamily="34" charset="0"/>
                         </a:rPr>
                         <a:t>214</a:t>
+                      </a:r>
+                    </a:p>
+                  </a:txBody>
+                  <a:tcPr marL="9525" marR="9525" marT="9525" marB="0" anchor="b">
+                    <a:lnL w="12700" cap="flat" cmpd="sng" algn="ctr">
+                      <a:solidFill>
+                        <a:schemeClr val="tx1"/>
+                      </a:solidFill>
+                      <a:prstDash val="solid"/>
+                      <a:round/>
+                      <a:headEnd type="none" w="med" len="med"/>
+                      <a:tailEnd type="none" w="med" len="med"/>
+                    </a:lnL>
+                    <a:lnR w="12700" cap="flat" cmpd="sng" algn="ctr">
+                      <a:solidFill>
+                        <a:schemeClr val="tx1"/>
+                      </a:solidFill>
+                      <a:prstDash val="solid"/>
+                      <a:round/>
+                      <a:headEnd type="none" w="med" len="med"/>
+                      <a:tailEnd type="none" w="med" len="med"/>
+                    </a:lnR>
+                    <a:lnT w="12700" cap="flat" cmpd="sng" algn="ctr">
+                      <a:solidFill>
+                        <a:schemeClr val="tx1"/>
+                      </a:solidFill>
+                      <a:prstDash val="solid"/>
+                      <a:round/>
+                      <a:headEnd type="none" w="med" len="med"/>
+                      <a:tailEnd type="none" w="med" len="med"/>
+                    </a:lnT>
+                    <a:lnB w="12700" cap="flat" cmpd="sng" algn="ctr">
+                      <a:solidFill>
+                        <a:schemeClr val="tx1"/>
+                      </a:solidFill>
+                      <a:prstDash val="solid"/>
+                      <a:round/>
+                      <a:headEnd type="none" w="med" len="med"/>
+                      <a:tailEnd type="none" w="med" len="med"/>
+                    </a:lnB>
+                  </a:tcPr>
+                </a:tc>
+                <a:tc>
+                  <a:txBody>
+                    <a:bodyPr/>
+                    <a:lstStyle/>
+                    <a:p>
+                      <a:pPr algn="r" fontAlgn="b"/>
+                      <a:r>
+                        <a:rPr lang="en-MY" sz="900" b="0" i="0" u="none" strike="noStrike" dirty="0">
+                          <a:solidFill>
+                            <a:srgbClr val="000000"/>
+                          </a:solidFill>
+                          <a:effectLst/>
+                          <a:latin typeface="Calibri" panose="020F0502020204030204" pitchFamily="34" charset="0"/>
+                        </a:rPr>
+                        <a:t>-3090000</a:t>
                       </a:r>
                     </a:p>
                   </a:txBody>
@@ -19941,7 +21649,7 @@
                           <a:effectLst/>
                           <a:latin typeface="Calibri" panose="020F0502020204030204" pitchFamily="34" charset="0"/>
                         </a:rPr>
-                        <a:t>-3090000</a:t>
+                        <a:t>11</a:t>
                       </a:r>
                     </a:p>
                   </a:txBody>
@@ -19984,66 +21692,9 @@
                     </a:lnB>
                   </a:tcPr>
                 </a:tc>
-                <a:tc>
-                  <a:txBody>
-                    <a:bodyPr/>
-                    <a:lstStyle/>
-                    <a:p>
-                      <a:pPr algn="r" fontAlgn="b"/>
-                      <a:r>
-                        <a:rPr lang="en-MY" sz="900" b="0" i="0" u="none" strike="noStrike" dirty="0">
-                          <a:solidFill>
-                            <a:srgbClr val="000000"/>
-                          </a:solidFill>
-                          <a:effectLst/>
-                          <a:latin typeface="Calibri" panose="020F0502020204030204" pitchFamily="34" charset="0"/>
-                        </a:rPr>
-                        <a:t>9</a:t>
-                      </a:r>
-                    </a:p>
-                  </a:txBody>
-                  <a:tcPr marL="9525" marR="9525" marT="9525" marB="0" anchor="b">
-                    <a:lnL w="12700" cap="flat" cmpd="sng" algn="ctr">
-                      <a:solidFill>
-                        <a:schemeClr val="tx1"/>
-                      </a:solidFill>
-                      <a:prstDash val="solid"/>
-                      <a:round/>
-                      <a:headEnd type="none" w="med" len="med"/>
-                      <a:tailEnd type="none" w="med" len="med"/>
-                    </a:lnL>
-                    <a:lnR w="12700" cap="flat" cmpd="sng" algn="ctr">
-                      <a:solidFill>
-                        <a:schemeClr val="tx1"/>
-                      </a:solidFill>
-                      <a:prstDash val="solid"/>
-                      <a:round/>
-                      <a:headEnd type="none" w="med" len="med"/>
-                      <a:tailEnd type="none" w="med" len="med"/>
-                    </a:lnR>
-                    <a:lnT w="12700" cap="flat" cmpd="sng" algn="ctr">
-                      <a:solidFill>
-                        <a:schemeClr val="tx1"/>
-                      </a:solidFill>
-                      <a:prstDash val="solid"/>
-                      <a:round/>
-                      <a:headEnd type="none" w="med" len="med"/>
-                      <a:tailEnd type="none" w="med" len="med"/>
-                    </a:lnT>
-                    <a:lnB w="12700" cap="flat" cmpd="sng" algn="ctr">
-                      <a:solidFill>
-                        <a:schemeClr val="tx1"/>
-                      </a:solidFill>
-                      <a:prstDash val="solid"/>
-                      <a:round/>
-                      <a:headEnd type="none" w="med" len="med"/>
-                      <a:tailEnd type="none" w="med" len="med"/>
-                    </a:lnB>
-                  </a:tcPr>
-                </a:tc>
                 <a:extLst>
                   <a:ext uri="{0D108BD9-81ED-4DB2-BD59-A6C34878D82A}">
-                    <a16:rowId xmlns:a16="http://schemas.microsoft.com/office/drawing/2014/main" val="1994176752"/>
+                    <a16:rowId xmlns:a16="http://schemas.microsoft.com/office/drawing/2014/main" val="3767464674"/>
                   </a:ext>
                 </a:extLst>
               </a:tr>
@@ -20055,7 +21706,7 @@
                     <a:p>
                       <a:pPr algn="l" fontAlgn="b"/>
                       <a:r>
-                        <a:rPr lang="en-MY" sz="900" b="1" i="0" u="none" strike="noStrike">
+                        <a:rPr lang="en-MY" sz="900" b="1" i="0" u="none" strike="noStrike" dirty="0" err="1">
                           <a:solidFill>
                             <a:srgbClr val="000000"/>
                           </a:solidFill>
@@ -20064,6 +21715,13 @@
                         </a:rPr>
                         <a:t>LRegression</a:t>
                       </a:r>
+                      <a:endParaRPr lang="en-MY" sz="900" b="1" i="0" u="none" strike="noStrike" dirty="0">
+                        <a:solidFill>
+                          <a:srgbClr val="000000"/>
+                        </a:solidFill>
+                        <a:effectLst/>
+                        <a:latin typeface="Calibri" panose="020F0502020204030204" pitchFamily="34" charset="0"/>
+                      </a:endParaRPr>
                     </a:p>
                   </a:txBody>
                   <a:tcPr marL="9525" marR="9525" marT="9525" marB="0" anchor="b">
@@ -20122,7 +21780,7 @@
                           <a:effectLst/>
                           <a:latin typeface="Calibri" panose="020F0502020204030204" pitchFamily="34" charset="0"/>
                         </a:rPr>
-                        <a:t>0.636301</a:t>
+                        <a:t>0.939038</a:t>
                       </a:r>
                     </a:p>
                   </a:txBody>
@@ -20179,7 +21837,7 @@
                           <a:effectLst/>
                           <a:latin typeface="Calibri" panose="020F0502020204030204" pitchFamily="34" charset="0"/>
                         </a:rPr>
-                        <a:t>0.615586</a:t>
+                        <a:t>0.666586</a:t>
                       </a:r>
                     </a:p>
                   </a:txBody>
@@ -20236,7 +21894,7 @@
                           <a:effectLst/>
                           <a:latin typeface="Calibri" panose="020F0502020204030204" pitchFamily="34" charset="0"/>
                         </a:rPr>
-                        <a:t>0.636301</a:t>
+                        <a:t>0.939038</a:t>
                       </a:r>
                     </a:p>
                   </a:txBody>
@@ -20293,7 +21951,7 @@
                           <a:effectLst/>
                           <a:latin typeface="Calibri" panose="020F0502020204030204" pitchFamily="34" charset="0"/>
                         </a:rPr>
-                        <a:t>0.721004</a:t>
+                        <a:t>0.848745</a:t>
                       </a:r>
                     </a:p>
                   </a:txBody>
@@ -20350,7 +22008,7 @@
                           <a:effectLst/>
                           <a:latin typeface="Calibri" panose="020F0502020204030204" pitchFamily="34" charset="0"/>
                         </a:rPr>
-                        <a:t>0.279573</a:t>
+                        <a:t>0.879329</a:t>
                       </a:r>
                     </a:p>
                   </a:txBody>
@@ -20407,7 +22065,7 @@
                           <a:effectLst/>
                           <a:latin typeface="Calibri" panose="020F0502020204030204" pitchFamily="34" charset="0"/>
                         </a:rPr>
-                        <a:t>0.143681</a:t>
+                        <a:t>0.265241</a:t>
                       </a:r>
                     </a:p>
                   </a:txBody>
@@ -20464,7 +22122,7 @@
                           <a:effectLst/>
                           <a:latin typeface="Calibri" panose="020F0502020204030204" pitchFamily="34" charset="0"/>
                         </a:rPr>
-                        <a:t>0.590909</a:t>
+                        <a:t>0.940622</a:t>
                       </a:r>
                     </a:p>
                   </a:txBody>
@@ -20521,7 +22179,7 @@
                           <a:effectLst/>
                           <a:latin typeface="Calibri" panose="020F0502020204030204" pitchFamily="34" charset="0"/>
                         </a:rPr>
-                        <a:t>0.228471</a:t>
+                        <a:t>0.333333</a:t>
                       </a:r>
                     </a:p>
                   </a:txBody>
@@ -20578,7 +22236,7 @@
                           <a:effectLst/>
                           <a:latin typeface="Calibri" panose="020F0502020204030204" pitchFamily="34" charset="0"/>
                         </a:rPr>
-                        <a:t>742</a:t>
+                        <a:t>329</a:t>
                       </a:r>
                     </a:p>
                   </a:txBody>
@@ -20635,7 +22293,7 @@
                           <a:effectLst/>
                           <a:latin typeface="Calibri" panose="020F0502020204030204" pitchFamily="34" charset="0"/>
                         </a:rPr>
-                        <a:t>136</a:t>
+                        <a:t>147</a:t>
                       </a:r>
                     </a:p>
                   </a:txBody>
@@ -20692,7 +22350,64 @@
                           <a:effectLst/>
                           <a:latin typeface="Calibri" panose="020F0502020204030204" pitchFamily="34" charset="0"/>
                         </a:rPr>
-                        <a:t>130</a:t>
+                        <a:t>119</a:t>
+                      </a:r>
+                    </a:p>
+                  </a:txBody>
+                  <a:tcPr marL="9525" marR="9525" marT="9525" marB="0" anchor="b">
+                    <a:lnL w="12700" cap="flat" cmpd="sng" algn="ctr">
+                      <a:solidFill>
+                        <a:schemeClr val="tx1"/>
+                      </a:solidFill>
+                      <a:prstDash val="solid"/>
+                      <a:round/>
+                      <a:headEnd type="none" w="med" len="med"/>
+                      <a:tailEnd type="none" w="med" len="med"/>
+                    </a:lnL>
+                    <a:lnR w="12700" cap="flat" cmpd="sng" algn="ctr">
+                      <a:solidFill>
+                        <a:schemeClr val="tx1"/>
+                      </a:solidFill>
+                      <a:prstDash val="solid"/>
+                      <a:round/>
+                      <a:headEnd type="none" w="med" len="med"/>
+                      <a:tailEnd type="none" w="med" len="med"/>
+                    </a:lnR>
+                    <a:lnT w="12700" cap="flat" cmpd="sng" algn="ctr">
+                      <a:solidFill>
+                        <a:schemeClr val="tx1"/>
+                      </a:solidFill>
+                      <a:prstDash val="solid"/>
+                      <a:round/>
+                      <a:headEnd type="none" w="med" len="med"/>
+                      <a:tailEnd type="none" w="med" len="med"/>
+                    </a:lnT>
+                    <a:lnB w="12700" cap="flat" cmpd="sng" algn="ctr">
+                      <a:solidFill>
+                        <a:schemeClr val="tx1"/>
+                      </a:solidFill>
+                      <a:prstDash val="solid"/>
+                      <a:round/>
+                      <a:headEnd type="none" w="med" len="med"/>
+                      <a:tailEnd type="none" w="med" len="med"/>
+                    </a:lnB>
+                  </a:tcPr>
+                </a:tc>
+                <a:tc>
+                  <a:txBody>
+                    <a:bodyPr/>
+                    <a:lstStyle/>
+                    <a:p>
+                      <a:pPr algn="r" fontAlgn="b"/>
+                      <a:r>
+                        <a:rPr lang="en-MY" sz="900" b="0" i="0" u="none" strike="noStrike" dirty="0">
+                          <a:solidFill>
+                            <a:srgbClr val="000000"/>
+                          </a:solidFill>
+                          <a:effectLst/>
+                          <a:latin typeface="Calibri" panose="020F0502020204030204" pitchFamily="34" charset="0"/>
+                        </a:rPr>
+                        <a:t>-3388000</a:t>
                       </a:r>
                     </a:p>
                   </a:txBody>
@@ -20749,7 +22464,7 @@
                           <a:effectLst/>
                           <a:latin typeface="Calibri" panose="020F0502020204030204" pitchFamily="34" charset="0"/>
                         </a:rPr>
-                        <a:t>-3592000</a:t>
+                        <a:t>12</a:t>
                       </a:r>
                     </a:p>
                   </a:txBody>
@@ -20792,66 +22507,9 @@
                     </a:lnB>
                   </a:tcPr>
                 </a:tc>
-                <a:tc>
-                  <a:txBody>
-                    <a:bodyPr/>
-                    <a:lstStyle/>
-                    <a:p>
-                      <a:pPr algn="r" fontAlgn="b"/>
-                      <a:r>
-                        <a:rPr lang="en-MY" sz="900" b="0" i="0" u="none" strike="noStrike" dirty="0">
-                          <a:solidFill>
-                            <a:srgbClr val="000000"/>
-                          </a:solidFill>
-                          <a:effectLst/>
-                          <a:latin typeface="Calibri" panose="020F0502020204030204" pitchFamily="34" charset="0"/>
-                        </a:rPr>
-                        <a:t>10</a:t>
-                      </a:r>
-                    </a:p>
-                  </a:txBody>
-                  <a:tcPr marL="9525" marR="9525" marT="9525" marB="0" anchor="b">
-                    <a:lnL w="12700" cap="flat" cmpd="sng" algn="ctr">
-                      <a:solidFill>
-                        <a:schemeClr val="tx1"/>
-                      </a:solidFill>
-                      <a:prstDash val="solid"/>
-                      <a:round/>
-                      <a:headEnd type="none" w="med" len="med"/>
-                      <a:tailEnd type="none" w="med" len="med"/>
-                    </a:lnL>
-                    <a:lnR w="12700" cap="flat" cmpd="sng" algn="ctr">
-                      <a:solidFill>
-                        <a:schemeClr val="tx1"/>
-                      </a:solidFill>
-                      <a:prstDash val="solid"/>
-                      <a:round/>
-                      <a:headEnd type="none" w="med" len="med"/>
-                      <a:tailEnd type="none" w="med" len="med"/>
-                    </a:lnR>
-                    <a:lnT w="12700" cap="flat" cmpd="sng" algn="ctr">
-                      <a:solidFill>
-                        <a:schemeClr val="tx1"/>
-                      </a:solidFill>
-                      <a:prstDash val="solid"/>
-                      <a:round/>
-                      <a:headEnd type="none" w="med" len="med"/>
-                      <a:tailEnd type="none" w="med" len="med"/>
-                    </a:lnT>
-                    <a:lnB w="12700" cap="flat" cmpd="sng" algn="ctr">
-                      <a:solidFill>
-                        <a:schemeClr val="tx1"/>
-                      </a:solidFill>
-                      <a:prstDash val="solid"/>
-                      <a:round/>
-                      <a:headEnd type="none" w="med" len="med"/>
-                      <a:tailEnd type="none" w="med" len="med"/>
-                    </a:lnB>
-                  </a:tcPr>
-                </a:tc>
                 <a:extLst>
                   <a:ext uri="{0D108BD9-81ED-4DB2-BD59-A6C34878D82A}">
-                    <a16:rowId xmlns:a16="http://schemas.microsoft.com/office/drawing/2014/main" val="2197108998"/>
+                    <a16:rowId xmlns:a16="http://schemas.microsoft.com/office/drawing/2014/main" val="2761671601"/>
                   </a:ext>
                 </a:extLst>
               </a:tr>
@@ -21621,7 +23279,7 @@
                           <a:effectLst/>
                           <a:latin typeface="Calibri" panose="020F0502020204030204" pitchFamily="34" charset="0"/>
                         </a:rPr>
-                        <a:t>11</a:t>
+                        <a:t>13</a:t>
                       </a:r>
                     </a:p>
                   </a:txBody>
@@ -22145,8 +23803,8 @@
         </p:nvSpPr>
         <p:spPr>
           <a:xfrm>
-            <a:off x="4279131" y="3205839"/>
-            <a:ext cx="7755145" cy="2308324"/>
+            <a:off x="4208067" y="3531503"/>
+            <a:ext cx="7974934" cy="2308324"/>
           </a:xfrm>
           <a:prstGeom prst="rect">
             <a:avLst/>
@@ -22161,7 +23819,7 @@
           <a:p>
             <a:r>
               <a:rPr lang="en-MY" sz="1200" dirty="0"/>
-              <a:t>The above table shows total of 11 models being ranked according to their cost (calculation shown on the left side). Since this is an imbalanced dataset, the evaluation matric should not be focusing on Accuracy as it is misleading with the high score as most ‘ok’ category being categorized successfully. Instead, we should look at Matthew Correlation score and F1 score since it penalize False Negatives and False Positives, therefore, a more meaningful gauge for misclassification.</a:t>
+              <a:t>The above table shows total of 13 models being ranked according to their cost (calculation shown on the left side). Since this is an imbalanced dataset, the evaluation matric should not be focusing on Accuracy as it is misleading with the high score as most ‘ok’ category being categorized successfully. Instead, we should look at Matthew Correlation score and F1 score since it penalize False Negatives and False Positives, therefore, a more meaningful gauge for misclassification.</a:t>
             </a:r>
           </a:p>
           <a:p>
@@ -22223,7 +23881,7 @@
             </a:r>
             <a:r>
               <a:rPr lang="en-MY" sz="1200" dirty="0"/>
-              <a:t> model will incurred the least cost and thus it was chosen to predict the Test dataset.</a:t>
+              <a:t> model will incur the least cost and thus it was chosen to predict the Test dataset.</a:t>
             </a:r>
           </a:p>
         </p:txBody>
@@ -22259,7 +23917,7 @@
         </p:blipFill>
         <p:spPr>
           <a:xfrm>
-            <a:off x="5033212" y="848666"/>
+            <a:off x="5111922" y="782306"/>
             <a:ext cx="199501" cy="199501"/>
           </a:xfrm>
           <a:prstGeom prst="rect">
@@ -22281,7 +23939,7 @@
         </p:nvSpPr>
         <p:spPr>
           <a:xfrm>
-            <a:off x="4217063" y="5559847"/>
+            <a:off x="4217062" y="5814323"/>
             <a:ext cx="1989221" cy="369332"/>
           </a:xfrm>
           <a:prstGeom prst="rect">
@@ -22316,7 +23974,7 @@
         </p:nvSpPr>
         <p:spPr>
           <a:xfrm>
-            <a:off x="4217062" y="5888063"/>
+            <a:off x="4208067" y="6158151"/>
             <a:ext cx="7737898" cy="646331"/>
           </a:xfrm>
           <a:prstGeom prst="rect">

</xml_diff>

<commit_message>
updating slides to merge with q1 in google docs
</commit_message>
<xml_diff>
--- a/consolidated_answers.pptx
+++ b/consolidated_answers.pptx
@@ -6833,7 +6833,7 @@
           <a:p>
             <a:fld id="{5B59738F-BA60-493E-818C-8226DE26E785}" type="datetimeFigureOut">
               <a:rPr lang="en-MY" smtClean="0"/>
-              <a:t>4/9/2020</a:t>
+              <a:t>7/9/2020</a:t>
             </a:fld>
             <a:endParaRPr lang="en-MY"/>
           </a:p>
@@ -7033,7 +7033,7 @@
           <a:p>
             <a:fld id="{5B59738F-BA60-493E-818C-8226DE26E785}" type="datetimeFigureOut">
               <a:rPr lang="en-MY" smtClean="0"/>
-              <a:t>4/9/2020</a:t>
+              <a:t>7/9/2020</a:t>
             </a:fld>
             <a:endParaRPr lang="en-MY"/>
           </a:p>
@@ -7243,7 +7243,7 @@
           <a:p>
             <a:fld id="{5B59738F-BA60-493E-818C-8226DE26E785}" type="datetimeFigureOut">
               <a:rPr lang="en-MY" smtClean="0"/>
-              <a:t>4/9/2020</a:t>
+              <a:t>7/9/2020</a:t>
             </a:fld>
             <a:endParaRPr lang="en-MY"/>
           </a:p>
@@ -7443,7 +7443,7 @@
           <a:p>
             <a:fld id="{5B59738F-BA60-493E-818C-8226DE26E785}" type="datetimeFigureOut">
               <a:rPr lang="en-MY" smtClean="0"/>
-              <a:t>4/9/2020</a:t>
+              <a:t>7/9/2020</a:t>
             </a:fld>
             <a:endParaRPr lang="en-MY"/>
           </a:p>
@@ -7719,7 +7719,7 @@
           <a:p>
             <a:fld id="{5B59738F-BA60-493E-818C-8226DE26E785}" type="datetimeFigureOut">
               <a:rPr lang="en-MY" smtClean="0"/>
-              <a:t>4/9/2020</a:t>
+              <a:t>7/9/2020</a:t>
             </a:fld>
             <a:endParaRPr lang="en-MY"/>
           </a:p>
@@ -7987,7 +7987,7 @@
           <a:p>
             <a:fld id="{5B59738F-BA60-493E-818C-8226DE26E785}" type="datetimeFigureOut">
               <a:rPr lang="en-MY" smtClean="0"/>
-              <a:t>4/9/2020</a:t>
+              <a:t>7/9/2020</a:t>
             </a:fld>
             <a:endParaRPr lang="en-MY"/>
           </a:p>
@@ -8402,7 +8402,7 @@
           <a:p>
             <a:fld id="{5B59738F-BA60-493E-818C-8226DE26E785}" type="datetimeFigureOut">
               <a:rPr lang="en-MY" smtClean="0"/>
-              <a:t>4/9/2020</a:t>
+              <a:t>7/9/2020</a:t>
             </a:fld>
             <a:endParaRPr lang="en-MY"/>
           </a:p>
@@ -8544,7 +8544,7 @@
           <a:p>
             <a:fld id="{5B59738F-BA60-493E-818C-8226DE26E785}" type="datetimeFigureOut">
               <a:rPr lang="en-MY" smtClean="0"/>
-              <a:t>4/9/2020</a:t>
+              <a:t>7/9/2020</a:t>
             </a:fld>
             <a:endParaRPr lang="en-MY"/>
           </a:p>
@@ -8657,7 +8657,7 @@
           <a:p>
             <a:fld id="{5B59738F-BA60-493E-818C-8226DE26E785}" type="datetimeFigureOut">
               <a:rPr lang="en-MY" smtClean="0"/>
-              <a:t>4/9/2020</a:t>
+              <a:t>7/9/2020</a:t>
             </a:fld>
             <a:endParaRPr lang="en-MY"/>
           </a:p>
@@ -8970,7 +8970,7 @@
           <a:p>
             <a:fld id="{5B59738F-BA60-493E-818C-8226DE26E785}" type="datetimeFigureOut">
               <a:rPr lang="en-MY" smtClean="0"/>
-              <a:t>4/9/2020</a:t>
+              <a:t>7/9/2020</a:t>
             </a:fld>
             <a:endParaRPr lang="en-MY"/>
           </a:p>
@@ -9259,7 +9259,7 @@
           <a:p>
             <a:fld id="{5B59738F-BA60-493E-818C-8226DE26E785}" type="datetimeFigureOut">
               <a:rPr lang="en-MY" smtClean="0"/>
-              <a:t>4/9/2020</a:t>
+              <a:t>7/9/2020</a:t>
             </a:fld>
             <a:endParaRPr lang="en-MY"/>
           </a:p>
@@ -9502,7 +9502,7 @@
           <a:p>
             <a:fld id="{5B59738F-BA60-493E-818C-8226DE26E785}" type="datetimeFigureOut">
               <a:rPr lang="en-MY" smtClean="0"/>
-              <a:t>4/9/2020</a:t>
+              <a:t>7/9/2020</a:t>
             </a:fld>
             <a:endParaRPr lang="en-MY"/>
           </a:p>
@@ -23095,7 +23095,7 @@
         <p:spPr>
           <a:xfrm>
             <a:off x="4217066" y="3390003"/>
-            <a:ext cx="7974934" cy="1569660"/>
+            <a:ext cx="7974934" cy="1277273"/>
           </a:xfrm>
           <a:prstGeom prst="rect">
             <a:avLst/>
@@ -23109,28 +23109,28 @@
           <a:lstStyle/>
           <a:p>
             <a:r>
-              <a:rPr lang="en-MY" sz="1200" dirty="0"/>
+              <a:rPr lang="en-MY" sz="1100" dirty="0"/>
               <a:t>The above table shows total of 12 models being ranked according to their cost (calculation shown on the left side). Since this is an imbalanced dataset, the evaluation matric should not be focusing on Accuracy as it is misleading with the high score as most ‘ok’ category being categorized successfully. Instead, we should look at Matthew Correlation score and F1 score since it penalize False Negatives and False Positives, therefore, a more meaningful gauge for misclassification.</a:t>
             </a:r>
           </a:p>
           <a:p>
-            <a:endParaRPr lang="en-MY" sz="1200" dirty="0"/>
+            <a:endParaRPr lang="en-MY" sz="1100" dirty="0"/>
           </a:p>
           <a:p>
             <a:r>
-              <a:rPr lang="en-MY" sz="1200" dirty="0"/>
+              <a:rPr lang="en-MY" sz="1100" dirty="0"/>
               <a:t>The model which incurred lesser cost to the company will be chosen to predict the datasets which column ‘Insp’ of ‘</a:t>
             </a:r>
             <a:r>
-              <a:rPr lang="en-MY" sz="1200" dirty="0" err="1"/>
+              <a:rPr lang="en-MY" sz="1100" dirty="0" err="1"/>
               <a:t>unkn</a:t>
             </a:r>
             <a:r>
-              <a:rPr lang="en-MY" sz="1200" dirty="0"/>
+              <a:rPr lang="en-MY" sz="1100" dirty="0"/>
               <a:t>’. Our team identified that using </a:t>
             </a:r>
             <a:r>
-              <a:rPr lang="en-MY" sz="1200" i="1" dirty="0" err="1">
+              <a:rPr lang="en-MY" sz="1100" i="1" dirty="0" err="1">
                 <a:solidFill>
                   <a:srgbClr val="0070C0"/>
                 </a:solidFill>
@@ -23138,7 +23138,7 @@
               <a:t>RandomForest</a:t>
             </a:r>
             <a:r>
-              <a:rPr lang="en-MY" sz="1200" dirty="0"/>
+              <a:rPr lang="en-MY" sz="1100" dirty="0"/>
               <a:t> model will incur the least cost and thus it was chosen to predict the Test dataset.</a:t>
             </a:r>
           </a:p>
@@ -23197,7 +23197,7 @@
         </p:nvSpPr>
         <p:spPr>
           <a:xfrm>
-            <a:off x="4199997" y="4944962"/>
+            <a:off x="4191002" y="4578521"/>
             <a:ext cx="1989221" cy="369332"/>
           </a:xfrm>
           <a:prstGeom prst="rect">
@@ -23232,8 +23232,8 @@
         </p:nvSpPr>
         <p:spPr>
           <a:xfrm>
-            <a:off x="4191002" y="5288790"/>
-            <a:ext cx="7737898" cy="646331"/>
+            <a:off x="4191002" y="4947853"/>
+            <a:ext cx="7737898" cy="600164"/>
           </a:xfrm>
           <a:prstGeom prst="rect">
             <a:avLst/>
@@ -23247,7 +23247,7 @@
           <a:lstStyle/>
           <a:p>
             <a:r>
-              <a:rPr lang="en-MY" sz="1200" dirty="0"/>
+              <a:rPr lang="en-MY" sz="1100" dirty="0"/>
               <a:t>The model is being saved as a pickle file for reusability. The pickle file is then integrated into a flask RESTful API application,  and subsequently being deployed using docker. User Acceptance Test (UAT) should be conducted to test the scalability and reliability of the model through numerous iterations and different combination of datasets. </a:t>
             </a:r>
           </a:p>
@@ -23267,7 +23267,7 @@
         </p:nvSpPr>
         <p:spPr>
           <a:xfrm>
-            <a:off x="4191002" y="5872302"/>
+            <a:off x="4191002" y="5459262"/>
             <a:ext cx="3565353" cy="369332"/>
           </a:xfrm>
           <a:prstGeom prst="rect">
@@ -23302,8 +23302,8 @@
         </p:nvSpPr>
         <p:spPr>
           <a:xfrm>
-            <a:off x="4191002" y="6178815"/>
-            <a:ext cx="7737898" cy="646331"/>
+            <a:off x="4247149" y="5787339"/>
+            <a:ext cx="7737898" cy="1107996"/>
           </a:xfrm>
           <a:prstGeom prst="rect">
             <a:avLst/>
@@ -23317,8 +23317,14 @@
           <a:lstStyle/>
           <a:p>
             <a:r>
-              <a:rPr lang="en-MY" sz="1200" dirty="0"/>
-              <a:t>The model the team chosen will have high false positive rate, meaning it will detect a lot of ‘fraud’ cases even though the cases are ‘ok’. Thus, more time and money will be spend on investigating the fraud cases. Should the cost of undetected fraud decreases, the team may deploy alternate model balancing its lower false positive rate and lower cost.</a:t>
+              <a:rPr lang="en-MY" sz="1100" dirty="0"/>
+              <a:t>a. The model the team chosen will have high false positive rate, meaning it will detect a lot of ‘fraud’ cases even though the cases are ‘ok’. Thus, more time and money will be spend on investigating the fraud cases. Should the cost of undetected fraud decreases, the team may deploy alternate model balancing its lower false positive rate and lower cost.</a:t>
+            </a:r>
+          </a:p>
+          <a:p>
+            <a:r>
+              <a:rPr lang="en-MY" sz="1100" dirty="0"/>
+              <a:t>b. The unlabelled data is more then labelled data. There still a lot of uncertainties in determining the robustness of the data in the long run. The team should labelled more of the datasets to test the model to determine whether the model needs further fine tuning.</a:t>
             </a:r>
           </a:p>
         </p:txBody>

</xml_diff>